<commit_message>
initial working standalone charger firmware
  - ensure wallwart is valid before charging
  - ensure battery is valid before charging
  - handle deeply-discharged batteries
  - update UI state through LED
  - do NOT stay powered when charging battery and wallwart is unplugged
  - charge old, new and li-ion battery from other manufacturer (black one)
</commit_message>
<xml_diff>
--- a/Avatar_Micro_Robot/Robot_V2_Accessories/Battery Charger V2.X/trunk/supporting_files/StandaloneCharger_StateDiagram.pptx
+++ b/Avatar_Micro_Robot/Robot_V2_Accessories/Battery Charger V2.X/trunk/supporting_files/StandaloneCharger_StateDiagram.pptx
@@ -197,7 +197,7 @@
           <a:p>
             <a:fld id="{D3BF7B63-2A84-42C7-8E70-1194BF7A0440}" type="datetimeFigureOut">
               <a:rPr lang="en-US" smtClean="0"/>
-              <a:t>12/10/2012</a:t>
+              <a:t>12/13/2012</a:t>
             </a:fld>
             <a:endParaRPr lang="en-US"/>
           </a:p>
@@ -362,7 +362,7 @@
           <a:p>
             <a:fld id="{2A42F65A-C093-401C-9BB1-D6A509D3F1DF}" type="datetimeFigureOut">
               <a:rPr lang="en-US" smtClean="0"/>
-              <a:t>12/10/2012</a:t>
+              <a:t>12/13/2012</a:t>
             </a:fld>
             <a:endParaRPr lang="en-US"/>
           </a:p>
@@ -1456,7 +1456,7 @@
           <a:p>
             <a:fld id="{6DC25747-ADEF-44A5-B0A1-EA127634DA2C}" type="datetimeFigureOut">
               <a:rPr lang="en-US" smtClean="0"/>
-              <a:t>12/10/2012</a:t>
+              <a:t>12/13/2012</a:t>
             </a:fld>
             <a:endParaRPr lang="en-US"/>
           </a:p>
@@ -1626,7 +1626,7 @@
           <a:p>
             <a:fld id="{6DC25747-ADEF-44A5-B0A1-EA127634DA2C}" type="datetimeFigureOut">
               <a:rPr lang="en-US" smtClean="0"/>
-              <a:t>12/10/2012</a:t>
+              <a:t>12/13/2012</a:t>
             </a:fld>
             <a:endParaRPr lang="en-US"/>
           </a:p>
@@ -1806,7 +1806,7 @@
           <a:p>
             <a:fld id="{6DC25747-ADEF-44A5-B0A1-EA127634DA2C}" type="datetimeFigureOut">
               <a:rPr lang="en-US" smtClean="0"/>
-              <a:t>12/10/2012</a:t>
+              <a:t>12/13/2012</a:t>
             </a:fld>
             <a:endParaRPr lang="en-US"/>
           </a:p>
@@ -1976,7 +1976,7 @@
           <a:p>
             <a:fld id="{6DC25747-ADEF-44A5-B0A1-EA127634DA2C}" type="datetimeFigureOut">
               <a:rPr lang="en-US" smtClean="0"/>
-              <a:t>12/10/2012</a:t>
+              <a:t>12/13/2012</a:t>
             </a:fld>
             <a:endParaRPr lang="en-US"/>
           </a:p>
@@ -2222,7 +2222,7 @@
           <a:p>
             <a:fld id="{6DC25747-ADEF-44A5-B0A1-EA127634DA2C}" type="datetimeFigureOut">
               <a:rPr lang="en-US" smtClean="0"/>
-              <a:t>12/10/2012</a:t>
+              <a:t>12/13/2012</a:t>
             </a:fld>
             <a:endParaRPr lang="en-US"/>
           </a:p>
@@ -2510,7 +2510,7 @@
           <a:p>
             <a:fld id="{6DC25747-ADEF-44A5-B0A1-EA127634DA2C}" type="datetimeFigureOut">
               <a:rPr lang="en-US" smtClean="0"/>
-              <a:t>12/10/2012</a:t>
+              <a:t>12/13/2012</a:t>
             </a:fld>
             <a:endParaRPr lang="en-US"/>
           </a:p>
@@ -2932,7 +2932,7 @@
           <a:p>
             <a:fld id="{6DC25747-ADEF-44A5-B0A1-EA127634DA2C}" type="datetimeFigureOut">
               <a:rPr lang="en-US" smtClean="0"/>
-              <a:t>12/10/2012</a:t>
+              <a:t>12/13/2012</a:t>
             </a:fld>
             <a:endParaRPr lang="en-US"/>
           </a:p>
@@ -3050,7 +3050,7 @@
           <a:p>
             <a:fld id="{6DC25747-ADEF-44A5-B0A1-EA127634DA2C}" type="datetimeFigureOut">
               <a:rPr lang="en-US" smtClean="0"/>
-              <a:t>12/10/2012</a:t>
+              <a:t>12/13/2012</a:t>
             </a:fld>
             <a:endParaRPr lang="en-US"/>
           </a:p>
@@ -3145,7 +3145,7 @@
           <a:p>
             <a:fld id="{6DC25747-ADEF-44A5-B0A1-EA127634DA2C}" type="datetimeFigureOut">
               <a:rPr lang="en-US" smtClean="0"/>
-              <a:t>12/10/2012</a:t>
+              <a:t>12/13/2012</a:t>
             </a:fld>
             <a:endParaRPr lang="en-US"/>
           </a:p>
@@ -3422,7 +3422,7 @@
           <a:p>
             <a:fld id="{6DC25747-ADEF-44A5-B0A1-EA127634DA2C}" type="datetimeFigureOut">
               <a:rPr lang="en-US" smtClean="0"/>
-              <a:t>12/10/2012</a:t>
+              <a:t>12/13/2012</a:t>
             </a:fld>
             <a:endParaRPr lang="en-US"/>
           </a:p>
@@ -3675,7 +3675,7 @@
           <a:p>
             <a:fld id="{6DC25747-ADEF-44A5-B0A1-EA127634DA2C}" type="datetimeFigureOut">
               <a:rPr lang="en-US" smtClean="0"/>
-              <a:t>12/10/2012</a:t>
+              <a:t>12/13/2012</a:t>
             </a:fld>
             <a:endParaRPr lang="en-US"/>
           </a:p>
@@ -3888,7 +3888,7 @@
           <a:p>
             <a:fld id="{6DC25747-ADEF-44A5-B0A1-EA127634DA2C}" type="datetimeFigureOut">
               <a:rPr lang="en-US" smtClean="0"/>
-              <a:t>12/10/2012</a:t>
+              <a:t>12/13/2012</a:t>
             </a:fld>
             <a:endParaRPr lang="en-US"/>
           </a:p>
@@ -4377,11 +4377,7 @@
             </a:pPr>
             <a:r>
               <a:rPr lang="en-US" sz="3200" dirty="0" smtClean="0"/>
-              <a:t>Applies a ‘topping charge’ for batteries that stay connected for extended periods of </a:t>
-            </a:r>
-            <a:r>
-              <a:rPr lang="en-US" sz="3200" dirty="0" smtClean="0"/>
-              <a:t>time</a:t>
+              <a:t>Applies a ‘topping charge’ for batteries that stay connected for extended periods of time</a:t>
             </a:r>
           </a:p>
           <a:p>
@@ -4998,7 +4994,7 @@
         </p:nvSpPr>
         <p:spPr>
           <a:xfrm>
-            <a:off x="1823174" y="1027901"/>
+            <a:off x="934061" y="1111785"/>
             <a:ext cx="330427" cy="184607"/>
           </a:xfrm>
           <a:prstGeom prst="rect">
@@ -5034,7 +5030,7 @@
           </a:xfrm>
           <a:prstGeom prst="curvedConnector3">
             <a:avLst>
-              <a:gd name="adj1" fmla="val 162147"/>
+              <a:gd name="adj1" fmla="val 209030"/>
             </a:avLst>
           </a:prstGeom>
           <a:ln>
@@ -5064,7 +5060,7 @@
         </p:nvSpPr>
         <p:spPr>
           <a:xfrm>
-            <a:off x="5533267" y="7179679"/>
+            <a:off x="5495311" y="7467600"/>
             <a:ext cx="1228108" cy="369273"/>
           </a:xfrm>
           <a:prstGeom prst="rect">
@@ -5208,8 +5204,8 @@
         </p:nvCxnSpPr>
         <p:spPr>
           <a:xfrm rot="16200000" flipV="1">
-            <a:off x="1705399" y="4613370"/>
-            <a:ext cx="2381581" cy="1815603"/>
+            <a:off x="1827170" y="4735141"/>
+            <a:ext cx="2381581" cy="1572061"/>
           </a:xfrm>
           <a:prstGeom prst="curvedConnector3">
             <a:avLst>
@@ -5244,7 +5240,7 @@
         <p:spPr>
           <a:xfrm>
             <a:off x="2612193" y="5403139"/>
-            <a:ext cx="1090250" cy="461606"/>
+            <a:ext cx="1106280" cy="461606"/>
           </a:xfrm>
           <a:prstGeom prst="rect">
             <a:avLst/>
@@ -5324,8 +5320,13 @@
             </a:r>
             <a:r>
               <a:rPr lang="en-US" sz="600" dirty="0" smtClean="0"/>
-              <a:t>- turn on error indicator</a:t>
-            </a:r>
+              <a:t>- </a:t>
+            </a:r>
+            <a:r>
+              <a:rPr lang="en-US" sz="600" dirty="0" smtClean="0"/>
+              <a:t>update UI to indicate erring</a:t>
+            </a:r>
+            <a:endParaRPr lang="en-US" sz="600" dirty="0" smtClean="0"/>
           </a:p>
         </p:txBody>
       </p:sp>
@@ -5373,7 +5374,7 @@
         </p:nvSpPr>
         <p:spPr>
           <a:xfrm>
-            <a:off x="4023366" y="5748244"/>
+            <a:off x="4635196" y="5820077"/>
             <a:ext cx="1720230" cy="646272"/>
           </a:xfrm>
           <a:prstGeom prst="rect">
@@ -5504,14 +5505,14 @@
         <p:nvCxnSpPr>
           <p:cNvPr id="284" name="Curved Connector 283"/>
           <p:cNvCxnSpPr>
-            <a:endCxn id="55" idx="1"/>
+            <a:endCxn id="59" idx="1"/>
           </p:cNvCxnSpPr>
           <p:nvPr/>
         </p:nvCxnSpPr>
         <p:spPr>
           <a:xfrm>
-            <a:off x="1932083" y="1264382"/>
-            <a:ext cx="1814199" cy="1352291"/>
+            <a:off x="991058" y="1362985"/>
+            <a:ext cx="1225235" cy="463188"/>
           </a:xfrm>
           <a:prstGeom prst="curvedConnector3">
             <a:avLst>
@@ -5546,8 +5547,8 @@
         </p:nvSpPr>
         <p:spPr>
           <a:xfrm>
-            <a:off x="10167431" y="2347059"/>
-            <a:ext cx="1447800" cy="923271"/>
+            <a:off x="11309644" y="1659806"/>
+            <a:ext cx="1447800" cy="830938"/>
           </a:xfrm>
           <a:prstGeom prst="rect">
             <a:avLst/>
@@ -5702,7 +5703,7 @@
                   </a:schemeClr>
                 </a:solidFill>
               </a:rPr>
-              <a:t> - consider the duty cycle of a bad </a:t>
+              <a:t> - the maximum current the AC adapter</a:t>
             </a:r>
           </a:p>
           <a:p>
@@ -5724,37 +5725,8 @@
                   </a:schemeClr>
                 </a:solidFill>
               </a:rPr>
-              <a:t>   situation</a:t>
-            </a:r>
-          </a:p>
-          <a:p>
-            <a:r>
-              <a:rPr lang="en-US" sz="600" dirty="0">
-                <a:solidFill>
-                  <a:schemeClr val="accent3">
-                    <a:lumMod val="50000"/>
-                  </a:schemeClr>
-                </a:solidFill>
-              </a:rPr>
-              <a:t> </a:t>
-            </a:r>
-            <a:r>
-              <a:rPr lang="en-US" sz="600" dirty="0" smtClean="0">
-                <a:solidFill>
-                  <a:schemeClr val="accent3">
-                    <a:lumMod val="50000"/>
-                  </a:schemeClr>
-                </a:solidFill>
-              </a:rPr>
-              <a:t> - the limit to power the robot is ~1.5A</a:t>
-            </a:r>
-            <a:endParaRPr lang="en-US" sz="600" dirty="0">
-              <a:solidFill>
-                <a:schemeClr val="accent3">
-                  <a:lumMod val="50000"/>
-                </a:schemeClr>
-              </a:solidFill>
-            </a:endParaRPr>
+              <a:t>   can provide is 4.7A at 19V</a:t>
+            </a:r>
           </a:p>
         </p:txBody>
       </p:sp>
@@ -5811,7 +5783,7 @@
         <p:spPr>
           <a:xfrm>
             <a:off x="5751799" y="4483841"/>
-            <a:ext cx="1287419" cy="276940"/>
+            <a:ext cx="1766717" cy="461606"/>
           </a:xfrm>
           <a:prstGeom prst="rect">
             <a:avLst/>
@@ -5827,32 +5799,8 @@
           <a:lstStyle/>
           <a:p>
             <a:r>
-              <a:rPr lang="en-US" sz="600" u="sng" dirty="0"/>
-              <a:t>3</a:t>
-            </a:r>
-            <a:r>
               <a:rPr lang="en-US" sz="600" u="sng" dirty="0" smtClean="0"/>
-              <a:t>V/cell &lt; </a:t>
-            </a:r>
-            <a:r>
-              <a:rPr lang="en-US" sz="600" u="sng" dirty="0" err="1" smtClean="0"/>
-              <a:t>V</a:t>
-            </a:r>
-            <a:r>
-              <a:rPr lang="en-US" sz="600" u="sng" baseline="-25000" dirty="0" err="1" smtClean="0"/>
-              <a:t>sideA</a:t>
-            </a:r>
-            <a:r>
-              <a:rPr lang="en-US" sz="600" u="sng" dirty="0" smtClean="0"/>
-              <a:t> AND 3V/cell &lt; </a:t>
-            </a:r>
-            <a:r>
-              <a:rPr lang="en-US" sz="600" u="sng" dirty="0" err="1" smtClean="0"/>
-              <a:t>V</a:t>
-            </a:r>
-            <a:r>
-              <a:rPr lang="en-US" sz="600" u="sng" baseline="-25000" dirty="0" err="1" smtClean="0"/>
-              <a:t>sideB</a:t>
+              <a:t>Battery is revived (above dangerously low voltage)</a:t>
             </a:r>
             <a:endParaRPr lang="en-US" sz="600" u="sng" baseline="-25000" dirty="0">
               <a:solidFill>
@@ -5888,26 +5836,1534 @@
               <a:rPr lang="en-US" sz="600" dirty="0" smtClean="0"/>
               <a:t>3A/side)</a:t>
             </a:r>
+          </a:p>
+          <a:p>
+            <a:r>
+              <a:rPr lang="en-US" sz="600" dirty="0"/>
+              <a:t> </a:t>
+            </a:r>
+            <a:r>
+              <a:rPr lang="en-US" sz="600" dirty="0" smtClean="0"/>
+              <a:t> - configure charger</a:t>
+            </a:r>
+          </a:p>
+          <a:p>
+            <a:r>
+              <a:rPr lang="en-US" sz="600" dirty="0"/>
+              <a:t> </a:t>
+            </a:r>
+            <a:r>
+              <a:rPr lang="en-US" sz="600" dirty="0" smtClean="0"/>
+              <a:t> - delay long enough to a get a new A/D reading</a:t>
+            </a:r>
             <a:endParaRPr lang="en-US" sz="600" dirty="0"/>
           </a:p>
         </p:txBody>
       </p:sp>
       <p:cxnSp>
         <p:nvCxnSpPr>
-          <p:cNvPr id="291" name="Curved Connector 290"/>
+          <p:cNvPr id="299" name="Curved Connector 298"/>
+          <p:cNvCxnSpPr/>
+          <p:nvPr/>
+        </p:nvCxnSpPr>
+        <p:spPr>
+          <a:xfrm rot="5400000" flipH="1">
+            <a:off x="8493070" y="1712552"/>
+            <a:ext cx="114300" cy="381000"/>
+          </a:xfrm>
+          <a:prstGeom prst="curvedConnector4">
+            <a:avLst>
+              <a:gd name="adj1" fmla="val -405556"/>
+              <a:gd name="adj2" fmla="val 181667"/>
+            </a:avLst>
+          </a:prstGeom>
+          <a:ln>
+            <a:tailEnd type="arrow"/>
+          </a:ln>
+        </p:spPr>
+        <p:style>
+          <a:lnRef idx="1">
+            <a:schemeClr val="accent1"/>
+          </a:lnRef>
+          <a:fillRef idx="0">
+            <a:schemeClr val="accent1"/>
+          </a:fillRef>
+          <a:effectRef idx="0">
+            <a:schemeClr val="accent1"/>
+          </a:effectRef>
+          <a:fontRef idx="minor">
+            <a:schemeClr val="tx1"/>
+          </a:fontRef>
+        </p:style>
+      </p:cxnSp>
+      <p:sp>
+        <p:nvSpPr>
+          <p:cNvPr id="300" name="TextBox 299"/>
+          <p:cNvSpPr txBox="1"/>
+          <p:nvPr/>
+        </p:nvSpPr>
+        <p:spPr>
+          <a:xfrm>
+            <a:off x="8174577" y="2339704"/>
+            <a:ext cx="2017137" cy="553939"/>
+          </a:xfrm>
+          <a:prstGeom prst="rect">
+            <a:avLst/>
+          </a:prstGeom>
+          <a:solidFill>
+            <a:schemeClr val="bg1"/>
+          </a:solidFill>
+        </p:spPr>
+        <p:txBody>
+          <a:bodyPr wrap="square" lIns="91384" tIns="45691" rIns="91384" bIns="45691" rtlCol="0">
+            <a:spAutoFit/>
+          </a:bodyPr>
+          <a:lstStyle/>
+          <a:p>
+            <a:r>
+              <a:rPr lang="en-US" sz="600" u="sng" dirty="0"/>
+              <a:t>c</a:t>
+            </a:r>
+            <a:r>
+              <a:rPr lang="en-US" sz="600" u="sng" dirty="0" smtClean="0"/>
+              <a:t>harger-refresh </a:t>
+            </a:r>
+            <a:r>
+              <a:rPr lang="en-US" sz="600" u="sng" dirty="0"/>
+              <a:t>timer </a:t>
+            </a:r>
+            <a:r>
+              <a:rPr lang="en-US" sz="600" u="sng" dirty="0" smtClean="0"/>
+              <a:t>expired</a:t>
+            </a:r>
+            <a:endParaRPr lang="en-US" sz="600" dirty="0"/>
+          </a:p>
+          <a:p>
+            <a:r>
+              <a:rPr lang="en-US" sz="600" dirty="0" smtClean="0"/>
+              <a:t>  - start the charger refresh timer (~10s)</a:t>
+            </a:r>
+          </a:p>
+          <a:p>
+            <a:r>
+              <a:rPr lang="en-US" sz="600" dirty="0"/>
+              <a:t> </a:t>
+            </a:r>
+            <a:r>
+              <a:rPr lang="en-US" sz="600" dirty="0" smtClean="0"/>
+              <a:t> - increment </a:t>
+            </a:r>
+            <a:r>
+              <a:rPr lang="en-US" sz="600" dirty="0"/>
+              <a:t>the overall </a:t>
+            </a:r>
+            <a:r>
+              <a:rPr lang="en-US" sz="600" dirty="0" smtClean="0"/>
+              <a:t>current </a:t>
+            </a:r>
+            <a:r>
+              <a:rPr lang="en-US" sz="600" dirty="0"/>
+              <a:t>(</a:t>
+            </a:r>
+            <a:r>
+              <a:rPr lang="en-US" sz="600" dirty="0" err="1"/>
+              <a:t>I</a:t>
+            </a:r>
+            <a:r>
+              <a:rPr lang="en-US" sz="600" baseline="-25000" dirty="0" err="1"/>
+              <a:t>charge,max</a:t>
+            </a:r>
+            <a:r>
+              <a:rPr lang="en-US" sz="600" dirty="0" smtClean="0"/>
+              <a:t>) to slowly float</a:t>
+            </a:r>
+          </a:p>
+          <a:p>
+            <a:r>
+              <a:rPr lang="en-US" sz="600" dirty="0"/>
+              <a:t> </a:t>
+            </a:r>
+            <a:r>
+              <a:rPr lang="en-US" sz="600" dirty="0" smtClean="0"/>
+              <a:t>    up to the maximum in case it was ever decremented</a:t>
+            </a:r>
+          </a:p>
+          <a:p>
+            <a:r>
+              <a:rPr lang="en-US" sz="600" dirty="0" smtClean="0"/>
+              <a:t>  - configure charger with potentially updated </a:t>
+            </a:r>
+            <a:r>
+              <a:rPr lang="en-US" sz="600" dirty="0" err="1" smtClean="0"/>
+              <a:t>I</a:t>
+            </a:r>
+            <a:r>
+              <a:rPr lang="en-US" sz="600" baseline="-25000" dirty="0" err="1" smtClean="0"/>
+              <a:t>charge,max</a:t>
+            </a:r>
+            <a:endParaRPr lang="en-US" sz="600" baseline="-25000" dirty="0" smtClean="0"/>
+          </a:p>
+        </p:txBody>
+      </p:sp>
+      <p:sp>
+        <p:nvSpPr>
+          <p:cNvPr id="40" name="Rounded Rectangle 39"/>
+          <p:cNvSpPr/>
+          <p:nvPr/>
+        </p:nvSpPr>
+        <p:spPr>
+          <a:xfrm>
+            <a:off x="1828800" y="4074900"/>
+            <a:ext cx="806258" cy="255481"/>
+          </a:xfrm>
+          <a:prstGeom prst="roundRect">
+            <a:avLst/>
+          </a:prstGeom>
+        </p:spPr>
+        <p:style>
+          <a:lnRef idx="2">
+            <a:schemeClr val="accent1">
+              <a:shade val="50000"/>
+            </a:schemeClr>
+          </a:lnRef>
+          <a:fillRef idx="1">
+            <a:schemeClr val="accent1"/>
+          </a:fillRef>
+          <a:effectRef idx="0">
+            <a:schemeClr val="accent1"/>
+          </a:effectRef>
+          <a:fontRef idx="minor">
+            <a:schemeClr val="lt1"/>
+          </a:fontRef>
+        </p:style>
+        <p:txBody>
+          <a:bodyPr lIns="91384" tIns="45691" rIns="91384" bIns="45691" rtlCol="0" anchor="ctr"/>
+          <a:lstStyle/>
+          <a:p>
+            <a:pPr algn="ctr"/>
+            <a:r>
+              <a:rPr lang="en-US" sz="600" dirty="0" smtClean="0"/>
+              <a:t>Hanging</a:t>
+            </a:r>
+            <a:endParaRPr lang="en-US" sz="600" dirty="0"/>
+          </a:p>
+        </p:txBody>
+      </p:sp>
+      <p:sp>
+        <p:nvSpPr>
+          <p:cNvPr id="52" name="TextBox 51"/>
+          <p:cNvSpPr txBox="1"/>
+          <p:nvPr/>
+        </p:nvSpPr>
+        <p:spPr>
+          <a:xfrm>
+            <a:off x="1451143" y="3713122"/>
+            <a:ext cx="1447800" cy="276940"/>
+          </a:xfrm>
+          <a:prstGeom prst="rect">
+            <a:avLst/>
+          </a:prstGeom>
+          <a:solidFill>
+            <a:schemeClr val="bg1"/>
+          </a:solidFill>
+        </p:spPr>
+        <p:txBody>
+          <a:bodyPr wrap="square" lIns="91384" tIns="45691" rIns="91384" bIns="45691" rtlCol="0">
+            <a:spAutoFit/>
+          </a:bodyPr>
+          <a:lstStyle/>
+          <a:p>
+            <a:r>
+              <a:rPr lang="en-US" sz="600" dirty="0" smtClean="0">
+                <a:solidFill>
+                  <a:schemeClr val="accent3">
+                    <a:lumMod val="50000"/>
+                  </a:schemeClr>
+                </a:solidFill>
+              </a:rPr>
+              <a:t>This state is intended to indicate the need for human intervention</a:t>
+            </a:r>
+          </a:p>
+        </p:txBody>
+      </p:sp>
+      <p:sp>
+        <p:nvSpPr>
+          <p:cNvPr id="86" name="Rounded Rectangle 85"/>
+          <p:cNvSpPr/>
+          <p:nvPr/>
+        </p:nvSpPr>
+        <p:spPr>
+          <a:xfrm>
+            <a:off x="10401264" y="4760781"/>
+            <a:ext cx="762000" cy="228600"/>
+          </a:xfrm>
+          <a:prstGeom prst="roundRect">
+            <a:avLst/>
+          </a:prstGeom>
+        </p:spPr>
+        <p:style>
+          <a:lnRef idx="2">
+            <a:schemeClr val="accent1">
+              <a:shade val="50000"/>
+            </a:schemeClr>
+          </a:lnRef>
+          <a:fillRef idx="1">
+            <a:schemeClr val="accent1"/>
+          </a:fillRef>
+          <a:effectRef idx="0">
+            <a:schemeClr val="accent1"/>
+          </a:effectRef>
+          <a:fontRef idx="minor">
+            <a:schemeClr val="lt1"/>
+          </a:fontRef>
+        </p:style>
+        <p:txBody>
+          <a:bodyPr lIns="91384" tIns="45691" rIns="91384" bIns="45691" rtlCol="0" anchor="ctr"/>
+          <a:lstStyle/>
+          <a:p>
+            <a:pPr algn="ctr"/>
+            <a:r>
+              <a:rPr lang="en-US" sz="600" dirty="0" smtClean="0"/>
+              <a:t>Waiting</a:t>
+            </a:r>
+            <a:endParaRPr lang="en-US" sz="600" dirty="0"/>
+          </a:p>
+        </p:txBody>
+      </p:sp>
+      <p:cxnSp>
+        <p:nvCxnSpPr>
+          <p:cNvPr id="88" name="Curved Connector 87"/>
           <p:cNvCxnSpPr>
             <a:stCxn id="273" idx="3"/>
-            <a:endCxn id="302" idx="0"/>
+            <a:endCxn id="86" idx="2"/>
           </p:cNvCxnSpPr>
           <p:nvPr/>
         </p:nvCxnSpPr>
         <p:spPr>
-          <a:xfrm>
-            <a:off x="8024545" y="6154248"/>
-            <a:ext cx="1786169" cy="1095768"/>
+          <a:xfrm flipV="1">
+            <a:off x="8024545" y="4989381"/>
+            <a:ext cx="2757719" cy="1164867"/>
           </a:xfrm>
           <a:prstGeom prst="curvedConnector2">
             <a:avLst/>
+          </a:prstGeom>
+          <a:ln>
+            <a:tailEnd type="arrow"/>
+          </a:ln>
+        </p:spPr>
+        <p:style>
+          <a:lnRef idx="1">
+            <a:schemeClr val="accent1"/>
+          </a:lnRef>
+          <a:fillRef idx="0">
+            <a:schemeClr val="accent1"/>
+          </a:fillRef>
+          <a:effectRef idx="0">
+            <a:schemeClr val="accent1"/>
+          </a:effectRef>
+          <a:fontRef idx="minor">
+            <a:schemeClr val="tx1"/>
+          </a:fontRef>
+        </p:style>
+      </p:cxnSp>
+      <p:sp>
+        <p:nvSpPr>
+          <p:cNvPr id="82" name="TextBox 81"/>
+          <p:cNvSpPr txBox="1"/>
+          <p:nvPr/>
+        </p:nvSpPr>
+        <p:spPr>
+          <a:xfrm>
+            <a:off x="9429714" y="5264669"/>
+            <a:ext cx="1503825" cy="369273"/>
+          </a:xfrm>
+          <a:prstGeom prst="rect">
+            <a:avLst/>
+          </a:prstGeom>
+          <a:solidFill>
+            <a:schemeClr val="bg1"/>
+          </a:solidFill>
+        </p:spPr>
+        <p:txBody>
+          <a:bodyPr wrap="none" lIns="91384" tIns="45691" rIns="91384" bIns="45691" rtlCol="0">
+            <a:spAutoFit/>
+          </a:bodyPr>
+          <a:lstStyle/>
+          <a:p>
+            <a:r>
+              <a:rPr lang="en-US" sz="600" u="sng" dirty="0" err="1" smtClean="0"/>
+              <a:t>I</a:t>
+            </a:r>
+            <a:r>
+              <a:rPr lang="en-US" sz="600" u="sng" baseline="-25000" dirty="0" err="1" smtClean="0"/>
+              <a:t>sideA</a:t>
+            </a:r>
+            <a:r>
+              <a:rPr lang="en-US" sz="600" u="sng" dirty="0" smtClean="0"/>
+              <a:t> &lt; (0.1/h*C/2) AND </a:t>
+            </a:r>
+            <a:r>
+              <a:rPr lang="en-US" sz="600" u="sng" dirty="0" err="1" smtClean="0"/>
+              <a:t>I</a:t>
+            </a:r>
+            <a:r>
+              <a:rPr lang="en-US" sz="600" u="sng" baseline="-25000" dirty="0" err="1" smtClean="0"/>
+              <a:t>sideB</a:t>
+            </a:r>
+            <a:r>
+              <a:rPr lang="en-US" sz="600" u="sng" dirty="0" smtClean="0"/>
+              <a:t> </a:t>
+            </a:r>
+            <a:r>
+              <a:rPr lang="en-US" sz="600" u="sng" dirty="0"/>
+              <a:t>&lt; (</a:t>
+            </a:r>
+            <a:r>
+              <a:rPr lang="en-US" sz="600" u="sng" dirty="0" smtClean="0"/>
+              <a:t>0.1/h*C/2)</a:t>
+            </a:r>
+            <a:endParaRPr lang="en-US" sz="600" u="sng" dirty="0"/>
+          </a:p>
+          <a:p>
+            <a:r>
+              <a:rPr lang="en-US" sz="600" dirty="0" smtClean="0"/>
+              <a:t>  - disconnect the </a:t>
+            </a:r>
+            <a:r>
+              <a:rPr lang="en-US" sz="600" dirty="0" smtClean="0"/>
+              <a:t>charger</a:t>
+            </a:r>
+          </a:p>
+          <a:p>
+            <a:r>
+              <a:rPr lang="en-US" sz="600" dirty="0"/>
+              <a:t> </a:t>
+            </a:r>
+            <a:r>
+              <a:rPr lang="en-US" sz="600" dirty="0" smtClean="0"/>
+              <a:t> - update the UI to indicate done charging</a:t>
+            </a:r>
+            <a:endParaRPr lang="en-US" sz="600" dirty="0" smtClean="0"/>
+          </a:p>
+        </p:txBody>
+      </p:sp>
+      <p:cxnSp>
+        <p:nvCxnSpPr>
+          <p:cNvPr id="96" name="Curved Connector 95"/>
+          <p:cNvCxnSpPr>
+            <a:stCxn id="86" idx="1"/>
+            <a:endCxn id="273" idx="0"/>
+          </p:cNvCxnSpPr>
+          <p:nvPr/>
+        </p:nvCxnSpPr>
+        <p:spPr>
+          <a:xfrm rot="10800000" flipV="1">
+            <a:off x="7643546" y="4875080"/>
+            <a:ext cx="2757719" cy="1164867"/>
+          </a:xfrm>
+          <a:prstGeom prst="curvedConnector2">
+            <a:avLst/>
+          </a:prstGeom>
+          <a:ln>
+            <a:tailEnd type="arrow"/>
+          </a:ln>
+        </p:spPr>
+        <p:style>
+          <a:lnRef idx="1">
+            <a:schemeClr val="accent1"/>
+          </a:lnRef>
+          <a:fillRef idx="0">
+            <a:schemeClr val="accent1"/>
+          </a:fillRef>
+          <a:effectRef idx="0">
+            <a:schemeClr val="accent1"/>
+          </a:effectRef>
+          <a:fontRef idx="minor">
+            <a:schemeClr val="tx1"/>
+          </a:fontRef>
+        </p:style>
+      </p:cxnSp>
+      <p:sp>
+        <p:nvSpPr>
+          <p:cNvPr id="92" name="TextBox 91"/>
+          <p:cNvSpPr txBox="1"/>
+          <p:nvPr/>
+        </p:nvSpPr>
+        <p:spPr>
+          <a:xfrm>
+            <a:off x="8224727" y="4706843"/>
+            <a:ext cx="1422071" cy="553939"/>
+          </a:xfrm>
+          <a:prstGeom prst="rect">
+            <a:avLst/>
+          </a:prstGeom>
+          <a:solidFill>
+            <a:schemeClr val="bg1"/>
+          </a:solidFill>
+        </p:spPr>
+        <p:txBody>
+          <a:bodyPr wrap="none" lIns="91384" tIns="45691" rIns="91384" bIns="45691" rtlCol="0">
+            <a:spAutoFit/>
+          </a:bodyPr>
+          <a:lstStyle/>
+          <a:p>
+            <a:r>
+              <a:rPr lang="en-US" sz="600" u="sng" dirty="0" err="1" smtClean="0"/>
+              <a:t>V</a:t>
+            </a:r>
+            <a:r>
+              <a:rPr lang="en-US" sz="600" u="sng" baseline="-25000" dirty="0" err="1" smtClean="0"/>
+              <a:t>sideA</a:t>
+            </a:r>
+            <a:r>
+              <a:rPr lang="en-US" sz="600" u="sng" dirty="0" smtClean="0"/>
+              <a:t> &lt; (4.1V/cell) OR </a:t>
+            </a:r>
+            <a:r>
+              <a:rPr lang="en-US" sz="600" u="sng" dirty="0" err="1" smtClean="0"/>
+              <a:t>V</a:t>
+            </a:r>
+            <a:r>
+              <a:rPr lang="en-US" sz="600" u="sng" baseline="-25000" dirty="0" err="1" smtClean="0"/>
+              <a:t>sideB</a:t>
+            </a:r>
+            <a:r>
+              <a:rPr lang="en-US" sz="600" u="sng" dirty="0" smtClean="0"/>
+              <a:t> </a:t>
+            </a:r>
+            <a:r>
+              <a:rPr lang="en-US" sz="600" u="sng" dirty="0"/>
+              <a:t>&lt; </a:t>
+            </a:r>
+            <a:r>
+              <a:rPr lang="en-US" sz="600" u="sng" dirty="0" smtClean="0"/>
+              <a:t>(4.1V/cell)</a:t>
+            </a:r>
+            <a:endParaRPr lang="en-US" sz="600" dirty="0" smtClean="0"/>
+          </a:p>
+          <a:p>
+            <a:r>
+              <a:rPr lang="en-US" sz="600" dirty="0" smtClean="0"/>
+              <a:t>  - turn on charging IC</a:t>
+            </a:r>
+          </a:p>
+          <a:p>
+            <a:r>
+              <a:rPr lang="en-US" sz="600" dirty="0"/>
+              <a:t> </a:t>
+            </a:r>
+            <a:r>
+              <a:rPr lang="en-US" sz="600" dirty="0" smtClean="0"/>
+              <a:t> - configure charging IC</a:t>
+            </a:r>
+          </a:p>
+          <a:p>
+            <a:r>
+              <a:rPr lang="en-US" sz="600" dirty="0"/>
+              <a:t> </a:t>
+            </a:r>
+            <a:r>
+              <a:rPr lang="en-US" sz="600" dirty="0" smtClean="0"/>
+              <a:t> - connect both </a:t>
+            </a:r>
+            <a:r>
+              <a:rPr lang="en-US" sz="600" dirty="0" smtClean="0"/>
+              <a:t>sides</a:t>
+            </a:r>
+          </a:p>
+          <a:p>
+            <a:r>
+              <a:rPr lang="en-US" sz="600" dirty="0"/>
+              <a:t> </a:t>
+            </a:r>
+            <a:r>
+              <a:rPr lang="en-US" sz="600" dirty="0" smtClean="0"/>
+              <a:t> - update UI to indicate charging</a:t>
+            </a:r>
+            <a:endParaRPr lang="en-US" sz="600" dirty="0" smtClean="0"/>
+          </a:p>
+        </p:txBody>
+      </p:sp>
+      <p:sp>
+        <p:nvSpPr>
+          <p:cNvPr id="53" name="TextBox 52"/>
+          <p:cNvSpPr txBox="1"/>
+          <p:nvPr/>
+        </p:nvSpPr>
+        <p:spPr>
+          <a:xfrm>
+            <a:off x="8249524" y="4476111"/>
+            <a:ext cx="1256598" cy="184607"/>
+          </a:xfrm>
+          <a:prstGeom prst="rect">
+            <a:avLst/>
+          </a:prstGeom>
+          <a:solidFill>
+            <a:schemeClr val="bg1"/>
+          </a:solidFill>
+        </p:spPr>
+        <p:txBody>
+          <a:bodyPr wrap="square" lIns="91384" tIns="45691" rIns="91384" bIns="45691" rtlCol="0">
+            <a:spAutoFit/>
+          </a:bodyPr>
+          <a:lstStyle/>
+          <a:p>
+            <a:r>
+              <a:rPr lang="en-US" sz="600" dirty="0">
+                <a:solidFill>
+                  <a:schemeClr val="accent3">
+                    <a:lumMod val="50000"/>
+                  </a:schemeClr>
+                </a:solidFill>
+              </a:rPr>
+              <a:t>g</a:t>
+            </a:r>
+            <a:r>
+              <a:rPr lang="en-US" sz="600" dirty="0" smtClean="0">
+                <a:solidFill>
+                  <a:schemeClr val="accent3">
+                    <a:lumMod val="50000"/>
+                  </a:schemeClr>
+                </a:solidFill>
+              </a:rPr>
+              <a:t>o back for a topping charge</a:t>
+            </a:r>
+            <a:endParaRPr lang="en-US" sz="600" dirty="0">
+              <a:solidFill>
+                <a:schemeClr val="accent3">
+                  <a:lumMod val="50000"/>
+                </a:schemeClr>
+              </a:solidFill>
+            </a:endParaRPr>
+          </a:p>
+        </p:txBody>
+      </p:sp>
+      <p:cxnSp>
+        <p:nvCxnSpPr>
+          <p:cNvPr id="57" name="Curved Connector 56"/>
+          <p:cNvCxnSpPr>
+            <a:stCxn id="54" idx="3"/>
+            <a:endCxn id="287" idx="0"/>
+          </p:cNvCxnSpPr>
+          <p:nvPr/>
+        </p:nvCxnSpPr>
+        <p:spPr>
+          <a:xfrm>
+            <a:off x="4508282" y="2606447"/>
+            <a:ext cx="1266705" cy="1203554"/>
+          </a:xfrm>
+          <a:prstGeom prst="curvedConnector2">
+            <a:avLst/>
+          </a:prstGeom>
+          <a:ln>
+            <a:tailEnd type="arrow"/>
+          </a:ln>
+        </p:spPr>
+        <p:style>
+          <a:lnRef idx="1">
+            <a:schemeClr val="accent1"/>
+          </a:lnRef>
+          <a:fillRef idx="0">
+            <a:schemeClr val="accent1"/>
+          </a:fillRef>
+          <a:effectRef idx="0">
+            <a:schemeClr val="accent1"/>
+          </a:effectRef>
+          <a:fontRef idx="minor">
+            <a:schemeClr val="tx1"/>
+          </a:fontRef>
+        </p:style>
+      </p:cxnSp>
+      <p:sp>
+        <p:nvSpPr>
+          <p:cNvPr id="60" name="TextBox 59"/>
+          <p:cNvSpPr txBox="1"/>
+          <p:nvPr/>
+        </p:nvSpPr>
+        <p:spPr>
+          <a:xfrm>
+            <a:off x="4941836" y="2819400"/>
+            <a:ext cx="1358754" cy="369273"/>
+          </a:xfrm>
+          <a:prstGeom prst="rect">
+            <a:avLst/>
+          </a:prstGeom>
+          <a:solidFill>
+            <a:schemeClr val="bg1"/>
+          </a:solidFill>
+        </p:spPr>
+        <p:txBody>
+          <a:bodyPr wrap="square" lIns="91384" tIns="45691" rIns="91384" bIns="45691" rtlCol="0">
+            <a:spAutoFit/>
+          </a:bodyPr>
+          <a:lstStyle/>
+          <a:p>
+            <a:r>
+              <a:rPr lang="en-US" sz="600" u="sng" dirty="0"/>
+              <a:t>v</a:t>
+            </a:r>
+            <a:r>
+              <a:rPr lang="en-US" sz="600" u="sng" dirty="0" smtClean="0"/>
+              <a:t>alid battery detected</a:t>
+            </a:r>
+            <a:endParaRPr lang="en-US" sz="600" u="sng" dirty="0"/>
+          </a:p>
+          <a:p>
+            <a:r>
+              <a:rPr lang="en-US" sz="600" dirty="0" smtClean="0"/>
+              <a:t>  - update the UI to indicate </a:t>
+            </a:r>
+            <a:r>
+              <a:rPr lang="en-US" sz="600" dirty="0" smtClean="0"/>
+              <a:t>charging</a:t>
+            </a:r>
+          </a:p>
+          <a:p>
+            <a:r>
+              <a:rPr lang="en-US" sz="600" dirty="0"/>
+              <a:t> </a:t>
+            </a:r>
+            <a:r>
+              <a:rPr lang="en-US" sz="600" dirty="0" smtClean="0"/>
+              <a:t> - enable charging IC</a:t>
+            </a:r>
+            <a:endParaRPr lang="en-US" sz="600" dirty="0" smtClean="0"/>
+          </a:p>
+        </p:txBody>
+      </p:sp>
+      <p:sp>
+        <p:nvSpPr>
+          <p:cNvPr id="65" name="TextBox 64"/>
+          <p:cNvSpPr txBox="1"/>
+          <p:nvPr/>
+        </p:nvSpPr>
+        <p:spPr>
+          <a:xfrm>
+            <a:off x="6939749" y="3673968"/>
+            <a:ext cx="645591" cy="184607"/>
+          </a:xfrm>
+          <a:prstGeom prst="rect">
+            <a:avLst/>
+          </a:prstGeom>
+          <a:solidFill>
+            <a:schemeClr val="bg1"/>
+          </a:solidFill>
+        </p:spPr>
+        <p:txBody>
+          <a:bodyPr wrap="square" lIns="91384" tIns="45691" rIns="91384" bIns="45691" rtlCol="0">
+            <a:spAutoFit/>
+          </a:bodyPr>
+          <a:lstStyle/>
+          <a:p>
+            <a:r>
+              <a:rPr lang="en-US" sz="600" dirty="0" smtClean="0">
+                <a:solidFill>
+                  <a:schemeClr val="accent3">
+                    <a:lumMod val="50000"/>
+                  </a:schemeClr>
+                </a:solidFill>
+              </a:rPr>
+              <a:t>battery pulled</a:t>
+            </a:r>
+          </a:p>
+        </p:txBody>
+      </p:sp>
+      <p:sp>
+        <p:nvSpPr>
+          <p:cNvPr id="54" name="Rounded Rectangle 53"/>
+          <p:cNvSpPr/>
+          <p:nvPr/>
+        </p:nvSpPr>
+        <p:spPr>
+          <a:xfrm>
+            <a:off x="3746282" y="2492147"/>
+            <a:ext cx="762000" cy="228600"/>
+          </a:xfrm>
+          <a:prstGeom prst="roundRect">
+            <a:avLst/>
+          </a:prstGeom>
+        </p:spPr>
+        <p:style>
+          <a:lnRef idx="2">
+            <a:schemeClr val="accent1">
+              <a:shade val="50000"/>
+            </a:schemeClr>
+          </a:lnRef>
+          <a:fillRef idx="1">
+            <a:schemeClr val="accent1"/>
+          </a:fillRef>
+          <a:effectRef idx="0">
+            <a:schemeClr val="accent1"/>
+          </a:effectRef>
+          <a:fontRef idx="minor">
+            <a:schemeClr val="lt1"/>
+          </a:fontRef>
+        </p:style>
+        <p:txBody>
+          <a:bodyPr lIns="91384" tIns="45691" rIns="91384" bIns="45691" rtlCol="0" anchor="ctr"/>
+          <a:lstStyle/>
+          <a:p>
+            <a:pPr algn="ctr"/>
+            <a:r>
+              <a:rPr lang="en-US" sz="600" dirty="0" smtClean="0"/>
+              <a:t>Pursuing Battery</a:t>
+            </a:r>
+            <a:endParaRPr lang="en-US" sz="600" dirty="0"/>
+          </a:p>
+        </p:txBody>
+      </p:sp>
+      <p:grpSp>
+        <p:nvGrpSpPr>
+          <p:cNvPr id="10" name="Group 9"/>
+          <p:cNvGrpSpPr/>
+          <p:nvPr/>
+        </p:nvGrpSpPr>
+        <p:grpSpPr>
+          <a:xfrm>
+            <a:off x="5774987" y="3479976"/>
+            <a:ext cx="1619031" cy="633867"/>
+            <a:chOff x="5774987" y="3479976"/>
+            <a:chExt cx="1619031" cy="633867"/>
+          </a:xfrm>
+        </p:grpSpPr>
+        <p:cxnSp>
+          <p:nvCxnSpPr>
+            <p:cNvPr id="63" name="Curved Connector 62"/>
+            <p:cNvCxnSpPr>
+              <a:stCxn id="287" idx="2"/>
+              <a:endCxn id="66" idx="2"/>
+            </p:cNvCxnSpPr>
+            <p:nvPr/>
+          </p:nvCxnSpPr>
+          <p:spPr>
+            <a:xfrm rot="5400000" flipH="1" flipV="1">
+              <a:off x="6025635" y="3413935"/>
+              <a:ext cx="374018" cy="875314"/>
+            </a:xfrm>
+            <a:prstGeom prst="curvedConnector3">
+              <a:avLst>
+                <a:gd name="adj1" fmla="val -28523"/>
+              </a:avLst>
+            </a:prstGeom>
+            <a:ln>
+              <a:tailEnd type="arrow"/>
+            </a:ln>
+          </p:spPr>
+          <p:style>
+            <a:lnRef idx="1">
+              <a:schemeClr val="accent1"/>
+            </a:lnRef>
+            <a:fillRef idx="0">
+              <a:schemeClr val="accent1"/>
+            </a:fillRef>
+            <a:effectRef idx="0">
+              <a:schemeClr val="accent1"/>
+            </a:effectRef>
+            <a:fontRef idx="minor">
+              <a:schemeClr val="tx1"/>
+            </a:fontRef>
+          </p:style>
+        </p:cxnSp>
+        <p:sp>
+          <p:nvSpPr>
+            <p:cNvPr id="64" name="TextBox 63"/>
+            <p:cNvSpPr txBox="1"/>
+            <p:nvPr/>
+          </p:nvSpPr>
+          <p:spPr>
+            <a:xfrm>
+              <a:off x="6300590" y="3836903"/>
+              <a:ext cx="1093428" cy="276940"/>
+            </a:xfrm>
+            <a:prstGeom prst="rect">
+              <a:avLst/>
+            </a:prstGeom>
+            <a:solidFill>
+              <a:schemeClr val="bg1"/>
+            </a:solidFill>
+          </p:spPr>
+          <p:txBody>
+            <a:bodyPr wrap="square" lIns="91384" tIns="45691" rIns="91384" bIns="45691" rtlCol="0">
+              <a:spAutoFit/>
+            </a:bodyPr>
+            <a:lstStyle/>
+            <a:p>
+              <a:r>
+                <a:rPr lang="en-US" sz="600" u="sng" dirty="0"/>
+                <a:t>0V </a:t>
+              </a:r>
+              <a:r>
+                <a:rPr lang="en-US" sz="600" u="sng" dirty="0" smtClean="0"/>
+                <a:t>~= </a:t>
+              </a:r>
+              <a:r>
+                <a:rPr lang="en-US" sz="600" u="sng" dirty="0" err="1"/>
+                <a:t>I</a:t>
+              </a:r>
+              <a:r>
+                <a:rPr lang="en-US" sz="600" u="sng" baseline="-25000" dirty="0" err="1" smtClean="0"/>
+                <a:t>sideA</a:t>
+              </a:r>
+              <a:r>
+                <a:rPr lang="en-US" sz="600" u="sng" dirty="0" smtClean="0"/>
+                <a:t> </a:t>
+              </a:r>
+              <a:r>
+                <a:rPr lang="en-US" sz="600" u="sng" dirty="0"/>
+                <a:t>AND 0V </a:t>
+              </a:r>
+              <a:r>
+                <a:rPr lang="en-US" sz="600" u="sng" dirty="0" smtClean="0"/>
+                <a:t>~= </a:t>
+              </a:r>
+              <a:r>
+                <a:rPr lang="en-US" sz="600" u="sng" dirty="0" err="1" smtClean="0"/>
+                <a:t>I</a:t>
+              </a:r>
+              <a:r>
+                <a:rPr lang="en-US" sz="600" u="sng" baseline="-25000" dirty="0" err="1" smtClean="0"/>
+                <a:t>sideB</a:t>
+              </a:r>
+              <a:endParaRPr lang="en-US" sz="600" u="sng" dirty="0"/>
+            </a:p>
+            <a:p>
+              <a:r>
+                <a:rPr lang="en-US" sz="600" dirty="0" smtClean="0"/>
+                <a:t>  - reset</a:t>
+              </a:r>
+              <a:endParaRPr lang="en-US" sz="600" baseline="-25000" dirty="0" smtClean="0"/>
+            </a:p>
+          </p:txBody>
+        </p:sp>
+        <p:sp>
+          <p:nvSpPr>
+            <p:cNvPr id="66" name="Rectangle 65"/>
+            <p:cNvSpPr/>
+            <p:nvPr/>
+          </p:nvSpPr>
+          <p:spPr>
+            <a:xfrm>
+              <a:off x="6498713" y="3479976"/>
+              <a:ext cx="303175" cy="184607"/>
+            </a:xfrm>
+            <a:prstGeom prst="rect">
+              <a:avLst/>
+            </a:prstGeom>
+          </p:spPr>
+          <p:txBody>
+            <a:bodyPr wrap="none" lIns="91384" tIns="45691" rIns="91384" bIns="45691">
+              <a:spAutoFit/>
+            </a:bodyPr>
+            <a:lstStyle/>
+            <a:p>
+              <a:r>
+                <a:rPr lang="en-US" sz="600" dirty="0" smtClean="0"/>
+                <a:t>end</a:t>
+              </a:r>
+              <a:endParaRPr lang="en-US" sz="600" dirty="0"/>
+            </a:p>
+          </p:txBody>
+        </p:sp>
+      </p:grpSp>
+      <p:grpSp>
+        <p:nvGrpSpPr>
+          <p:cNvPr id="67" name="Group 66"/>
+          <p:cNvGrpSpPr/>
+          <p:nvPr/>
+        </p:nvGrpSpPr>
+        <p:grpSpPr>
+          <a:xfrm>
+            <a:off x="7643544" y="6268548"/>
+            <a:ext cx="1413122" cy="1078859"/>
+            <a:chOff x="5276852" y="3282175"/>
+            <a:chExt cx="1413122" cy="1078859"/>
+          </a:xfrm>
+        </p:grpSpPr>
+        <p:cxnSp>
+          <p:nvCxnSpPr>
+            <p:cNvPr id="68" name="Curved Connector 67"/>
+            <p:cNvCxnSpPr>
+              <a:stCxn id="273" idx="2"/>
+              <a:endCxn id="70" idx="0"/>
+            </p:cNvCxnSpPr>
+            <p:nvPr/>
+          </p:nvCxnSpPr>
+          <p:spPr>
+            <a:xfrm rot="16200000" flipH="1">
+              <a:off x="5267708" y="3291319"/>
+              <a:ext cx="894252" cy="875963"/>
+            </a:xfrm>
+            <a:prstGeom prst="curvedConnector3">
+              <a:avLst>
+                <a:gd name="adj1" fmla="val 50000"/>
+              </a:avLst>
+            </a:prstGeom>
+            <a:ln>
+              <a:tailEnd type="arrow"/>
+            </a:ln>
+          </p:spPr>
+          <p:style>
+            <a:lnRef idx="1">
+              <a:schemeClr val="accent1"/>
+            </a:lnRef>
+            <a:fillRef idx="0">
+              <a:schemeClr val="accent1"/>
+            </a:fillRef>
+            <a:effectRef idx="0">
+              <a:schemeClr val="accent1"/>
+            </a:effectRef>
+            <a:fontRef idx="minor">
+              <a:schemeClr val="tx1"/>
+            </a:fontRef>
+          </p:style>
+        </p:cxnSp>
+        <p:sp>
+          <p:nvSpPr>
+            <p:cNvPr id="69" name="TextBox 68"/>
+            <p:cNvSpPr txBox="1"/>
+            <p:nvPr/>
+          </p:nvSpPr>
+          <p:spPr>
+            <a:xfrm>
+              <a:off x="5596546" y="3564023"/>
+              <a:ext cx="1093428" cy="276940"/>
+            </a:xfrm>
+            <a:prstGeom prst="rect">
+              <a:avLst/>
+            </a:prstGeom>
+            <a:solidFill>
+              <a:schemeClr val="bg1"/>
+            </a:solidFill>
+          </p:spPr>
+          <p:txBody>
+            <a:bodyPr wrap="square" lIns="91384" tIns="45691" rIns="91384" bIns="45691" rtlCol="0">
+              <a:spAutoFit/>
+            </a:bodyPr>
+            <a:lstStyle/>
+            <a:p>
+              <a:r>
+                <a:rPr lang="en-US" sz="600" u="sng" dirty="0"/>
+                <a:t>0V </a:t>
+              </a:r>
+              <a:r>
+                <a:rPr lang="en-US" sz="600" u="sng" dirty="0" smtClean="0"/>
+                <a:t>~= </a:t>
+              </a:r>
+              <a:r>
+                <a:rPr lang="en-US" sz="600" u="sng" dirty="0" err="1"/>
+                <a:t>I</a:t>
+              </a:r>
+              <a:r>
+                <a:rPr lang="en-US" sz="600" u="sng" baseline="-25000" dirty="0" err="1" smtClean="0"/>
+                <a:t>sideA</a:t>
+              </a:r>
+              <a:r>
+                <a:rPr lang="en-US" sz="600" u="sng" dirty="0" smtClean="0"/>
+                <a:t> </a:t>
+              </a:r>
+              <a:r>
+                <a:rPr lang="en-US" sz="600" u="sng" dirty="0"/>
+                <a:t>AND 0V </a:t>
+              </a:r>
+              <a:r>
+                <a:rPr lang="en-US" sz="600" u="sng" dirty="0" smtClean="0"/>
+                <a:t>~= </a:t>
+              </a:r>
+              <a:r>
+                <a:rPr lang="en-US" sz="600" u="sng" dirty="0" err="1" smtClean="0"/>
+                <a:t>I</a:t>
+              </a:r>
+              <a:r>
+                <a:rPr lang="en-US" sz="600" u="sng" baseline="-25000" dirty="0" err="1" smtClean="0"/>
+                <a:t>sideB</a:t>
+              </a:r>
+              <a:endParaRPr lang="en-US" sz="600" u="sng" dirty="0"/>
+            </a:p>
+            <a:p>
+              <a:r>
+                <a:rPr lang="en-US" sz="600" dirty="0" smtClean="0"/>
+                <a:t>  - reset</a:t>
+              </a:r>
+              <a:endParaRPr lang="en-US" sz="600" baseline="-25000" dirty="0" smtClean="0"/>
+            </a:p>
+          </p:txBody>
+        </p:sp>
+        <p:sp>
+          <p:nvSpPr>
+            <p:cNvPr id="70" name="Rectangle 69"/>
+            <p:cNvSpPr/>
+            <p:nvPr/>
+          </p:nvSpPr>
+          <p:spPr>
+            <a:xfrm>
+              <a:off x="6001228" y="4176427"/>
+              <a:ext cx="303175" cy="184607"/>
+            </a:xfrm>
+            <a:prstGeom prst="rect">
+              <a:avLst/>
+            </a:prstGeom>
+          </p:spPr>
+          <p:txBody>
+            <a:bodyPr wrap="none" lIns="91384" tIns="45691" rIns="91384" bIns="45691">
+              <a:spAutoFit/>
+            </a:bodyPr>
+            <a:lstStyle/>
+            <a:p>
+              <a:r>
+                <a:rPr lang="en-US" sz="600" dirty="0" smtClean="0"/>
+                <a:t>end</a:t>
+              </a:r>
+              <a:endParaRPr lang="en-US" sz="600" dirty="0"/>
+            </a:p>
+          </p:txBody>
+        </p:sp>
+      </p:grpSp>
+      <p:grpSp>
+        <p:nvGrpSpPr>
+          <p:cNvPr id="71" name="Group 70"/>
+          <p:cNvGrpSpPr/>
+          <p:nvPr/>
+        </p:nvGrpSpPr>
+        <p:grpSpPr>
+          <a:xfrm>
+            <a:off x="11163264" y="4347050"/>
+            <a:ext cx="1232188" cy="622610"/>
+            <a:chOff x="5620365" y="3479976"/>
+            <a:chExt cx="1232188" cy="622610"/>
+          </a:xfrm>
+        </p:grpSpPr>
+        <p:cxnSp>
+          <p:nvCxnSpPr>
+            <p:cNvPr id="72" name="Curved Connector 71"/>
+            <p:cNvCxnSpPr>
+              <a:stCxn id="86" idx="3"/>
+              <a:endCxn id="74" idx="2"/>
+            </p:cNvCxnSpPr>
+            <p:nvPr/>
+          </p:nvCxnSpPr>
+          <p:spPr>
+            <a:xfrm flipV="1">
+              <a:off x="5620365" y="3664583"/>
+              <a:ext cx="308000" cy="343424"/>
+            </a:xfrm>
+            <a:prstGeom prst="curvedConnector2">
+              <a:avLst/>
+            </a:prstGeom>
+            <a:ln>
+              <a:tailEnd type="arrow"/>
+            </a:ln>
+          </p:spPr>
+          <p:style>
+            <a:lnRef idx="1">
+              <a:schemeClr val="accent1"/>
+            </a:lnRef>
+            <a:fillRef idx="0">
+              <a:schemeClr val="accent1"/>
+            </a:fillRef>
+            <a:effectRef idx="0">
+              <a:schemeClr val="accent1"/>
+            </a:effectRef>
+            <a:fontRef idx="minor">
+              <a:schemeClr val="tx1"/>
+            </a:fontRef>
+          </p:style>
+        </p:cxnSp>
+        <p:sp>
+          <p:nvSpPr>
+            <p:cNvPr id="73" name="TextBox 72"/>
+            <p:cNvSpPr txBox="1"/>
+            <p:nvPr/>
+          </p:nvSpPr>
+          <p:spPr>
+            <a:xfrm>
+              <a:off x="5759125" y="3825646"/>
+              <a:ext cx="1093428" cy="276940"/>
+            </a:xfrm>
+            <a:prstGeom prst="rect">
+              <a:avLst/>
+            </a:prstGeom>
+            <a:solidFill>
+              <a:schemeClr val="bg1"/>
+            </a:solidFill>
+          </p:spPr>
+          <p:txBody>
+            <a:bodyPr wrap="square" lIns="91384" tIns="45691" rIns="91384" bIns="45691" rtlCol="0">
+              <a:spAutoFit/>
+            </a:bodyPr>
+            <a:lstStyle/>
+            <a:p>
+              <a:r>
+                <a:rPr lang="en-US" sz="600" u="sng" dirty="0"/>
+                <a:t>0V </a:t>
+              </a:r>
+              <a:r>
+                <a:rPr lang="en-US" sz="600" u="sng" dirty="0" smtClean="0"/>
+                <a:t>~= </a:t>
+              </a:r>
+              <a:r>
+                <a:rPr lang="en-US" sz="600" u="sng" dirty="0" err="1" smtClean="0"/>
+                <a:t>V</a:t>
+              </a:r>
+              <a:r>
+                <a:rPr lang="en-US" sz="600" u="sng" baseline="-25000" dirty="0" err="1" smtClean="0"/>
+                <a:t>sideA</a:t>
+              </a:r>
+              <a:r>
+                <a:rPr lang="en-US" sz="600" u="sng" dirty="0" smtClean="0"/>
+                <a:t> </a:t>
+              </a:r>
+              <a:r>
+                <a:rPr lang="en-US" sz="600" u="sng" dirty="0"/>
+                <a:t>AND 0V </a:t>
+              </a:r>
+              <a:r>
+                <a:rPr lang="en-US" sz="600" u="sng" dirty="0" smtClean="0"/>
+                <a:t>~= </a:t>
+              </a:r>
+              <a:r>
+                <a:rPr lang="en-US" sz="600" u="sng" dirty="0" err="1" smtClean="0"/>
+                <a:t>V</a:t>
+              </a:r>
+              <a:r>
+                <a:rPr lang="en-US" sz="600" u="sng" baseline="-25000" dirty="0" err="1" smtClean="0"/>
+                <a:t>sideB</a:t>
+              </a:r>
+              <a:endParaRPr lang="en-US" sz="600" u="sng" dirty="0"/>
+            </a:p>
+            <a:p>
+              <a:r>
+                <a:rPr lang="en-US" sz="600" dirty="0" smtClean="0"/>
+                <a:t>  - reset</a:t>
+              </a:r>
+              <a:endParaRPr lang="en-US" sz="600" baseline="-25000" dirty="0" smtClean="0"/>
+            </a:p>
+          </p:txBody>
+        </p:sp>
+        <p:sp>
+          <p:nvSpPr>
+            <p:cNvPr id="74" name="Rectangle 73"/>
+            <p:cNvSpPr/>
+            <p:nvPr/>
+          </p:nvSpPr>
+          <p:spPr>
+            <a:xfrm>
+              <a:off x="5776777" y="3479976"/>
+              <a:ext cx="303175" cy="184607"/>
+            </a:xfrm>
+            <a:prstGeom prst="rect">
+              <a:avLst/>
+            </a:prstGeom>
+          </p:spPr>
+          <p:txBody>
+            <a:bodyPr wrap="none" lIns="91384" tIns="45691" rIns="91384" bIns="45691">
+              <a:spAutoFit/>
+            </a:bodyPr>
+            <a:lstStyle/>
+            <a:p>
+              <a:r>
+                <a:rPr lang="en-US" sz="600" dirty="0" smtClean="0"/>
+                <a:t>end</a:t>
+              </a:r>
+              <a:endParaRPr lang="en-US" sz="600" dirty="0"/>
+            </a:p>
+          </p:txBody>
+        </p:sp>
+      </p:grpSp>
+      <p:sp>
+        <p:nvSpPr>
+          <p:cNvPr id="89" name="TextBox 88"/>
+          <p:cNvSpPr txBox="1"/>
+          <p:nvPr/>
+        </p:nvSpPr>
+        <p:spPr>
+          <a:xfrm>
+            <a:off x="11903097" y="4946970"/>
+            <a:ext cx="900285" cy="461606"/>
+          </a:xfrm>
+          <a:prstGeom prst="rect">
+            <a:avLst/>
+          </a:prstGeom>
+          <a:solidFill>
+            <a:schemeClr val="bg1"/>
+          </a:solidFill>
+        </p:spPr>
+        <p:txBody>
+          <a:bodyPr wrap="square" lIns="91384" tIns="45691" rIns="91384" bIns="45691" rtlCol="0">
+            <a:spAutoFit/>
+          </a:bodyPr>
+          <a:lstStyle/>
+          <a:p>
+            <a:r>
+              <a:rPr lang="en-US" sz="600" dirty="0" smtClean="0">
+                <a:solidFill>
+                  <a:schemeClr val="accent3">
+                    <a:lumMod val="50000"/>
+                  </a:schemeClr>
+                </a:solidFill>
+              </a:rPr>
+              <a:t>battery </a:t>
+            </a:r>
+            <a:r>
+              <a:rPr lang="en-US" sz="600" dirty="0">
+                <a:solidFill>
+                  <a:schemeClr val="accent3">
+                    <a:lumMod val="50000"/>
+                  </a:schemeClr>
+                </a:solidFill>
+              </a:rPr>
+              <a:t>pulled. monitor the voltage after de-powering the charging </a:t>
+            </a:r>
+            <a:r>
+              <a:rPr lang="en-US" sz="600" dirty="0" smtClean="0">
+                <a:solidFill>
+                  <a:schemeClr val="accent3">
+                    <a:lumMod val="50000"/>
+                  </a:schemeClr>
+                </a:solidFill>
+              </a:rPr>
+              <a:t>circuit</a:t>
+            </a:r>
+            <a:endParaRPr lang="en-US" sz="600" dirty="0">
+              <a:solidFill>
+                <a:schemeClr val="accent3">
+                  <a:lumMod val="50000"/>
+                </a:schemeClr>
+              </a:solidFill>
+            </a:endParaRPr>
+          </a:p>
+        </p:txBody>
+      </p:sp>
+      <p:sp>
+        <p:nvSpPr>
+          <p:cNvPr id="90" name="TextBox 89"/>
+          <p:cNvSpPr txBox="1"/>
+          <p:nvPr/>
+        </p:nvSpPr>
+        <p:spPr>
+          <a:xfrm>
+            <a:off x="8390200" y="6374045"/>
+            <a:ext cx="807894" cy="184607"/>
+          </a:xfrm>
+          <a:prstGeom prst="rect">
+            <a:avLst/>
+          </a:prstGeom>
+          <a:solidFill>
+            <a:schemeClr val="bg1"/>
+          </a:solidFill>
+        </p:spPr>
+        <p:txBody>
+          <a:bodyPr wrap="square" lIns="91384" tIns="45691" rIns="91384" bIns="45691" rtlCol="0">
+            <a:spAutoFit/>
+          </a:bodyPr>
+          <a:lstStyle/>
+          <a:p>
+            <a:r>
+              <a:rPr lang="en-US" sz="600" dirty="0" smtClean="0">
+                <a:solidFill>
+                  <a:schemeClr val="accent3">
+                    <a:lumMod val="50000"/>
+                  </a:schemeClr>
+                </a:solidFill>
+              </a:rPr>
+              <a:t>battery pulled</a:t>
+            </a:r>
+          </a:p>
+        </p:txBody>
+      </p:sp>
+      <p:sp>
+        <p:nvSpPr>
+          <p:cNvPr id="49" name="TextBox 48"/>
+          <p:cNvSpPr txBox="1"/>
+          <p:nvPr/>
+        </p:nvSpPr>
+        <p:spPr>
+          <a:xfrm>
+            <a:off x="1331448" y="1382866"/>
+            <a:ext cx="1264043" cy="276940"/>
+          </a:xfrm>
+          <a:prstGeom prst="rect">
+            <a:avLst/>
+          </a:prstGeom>
+          <a:solidFill>
+            <a:schemeClr val="bg1"/>
+          </a:solidFill>
+        </p:spPr>
+        <p:txBody>
+          <a:bodyPr wrap="square" lIns="91384" tIns="45691" rIns="91384" bIns="45691" rtlCol="0">
+            <a:spAutoFit/>
+          </a:bodyPr>
+          <a:lstStyle/>
+          <a:p>
+            <a:r>
+              <a:rPr lang="en-US" sz="600" dirty="0" smtClean="0"/>
+              <a:t>  - initialize pins</a:t>
+            </a:r>
+          </a:p>
+          <a:p>
+            <a:r>
+              <a:rPr lang="en-US" sz="600" dirty="0"/>
+              <a:t> </a:t>
+            </a:r>
+            <a:r>
+              <a:rPr lang="en-US" sz="600" dirty="0" smtClean="0"/>
+              <a:t> - initialize dependent modules</a:t>
+            </a:r>
+          </a:p>
+        </p:txBody>
+      </p:sp>
+      <p:cxnSp>
+        <p:nvCxnSpPr>
+          <p:cNvPr id="50" name="Curved Connector 49"/>
+          <p:cNvCxnSpPr/>
+          <p:nvPr/>
+        </p:nvCxnSpPr>
+        <p:spPr>
+          <a:xfrm rot="5400000" flipH="1">
+            <a:off x="10685889" y="1725219"/>
+            <a:ext cx="114300" cy="381000"/>
+          </a:xfrm>
+          <a:prstGeom prst="curvedConnector4">
+            <a:avLst>
+              <a:gd name="adj1" fmla="val -405556"/>
+              <a:gd name="adj2" fmla="val 173667"/>
+            </a:avLst>
+          </a:prstGeom>
+          <a:ln>
+            <a:tailEnd type="arrow"/>
+          </a:ln>
+        </p:spPr>
+        <p:style>
+          <a:lnRef idx="1">
+            <a:schemeClr val="accent1"/>
+          </a:lnRef>
+          <a:fillRef idx="0">
+            <a:schemeClr val="accent1"/>
+          </a:fillRef>
+          <a:effectRef idx="0">
+            <a:schemeClr val="accent1"/>
+          </a:effectRef>
+          <a:fontRef idx="minor">
+            <a:schemeClr val="tx1"/>
+          </a:fontRef>
+        </p:style>
+      </p:cxnSp>
+      <p:sp>
+        <p:nvSpPr>
+          <p:cNvPr id="51" name="TextBox 50"/>
+          <p:cNvSpPr txBox="1"/>
+          <p:nvPr/>
+        </p:nvSpPr>
+        <p:spPr>
+          <a:xfrm>
+            <a:off x="10329223" y="2277755"/>
+            <a:ext cx="827633" cy="276940"/>
+          </a:xfrm>
+          <a:prstGeom prst="rect">
+            <a:avLst/>
+          </a:prstGeom>
+          <a:solidFill>
+            <a:schemeClr val="bg1"/>
+          </a:solidFill>
+        </p:spPr>
+        <p:txBody>
+          <a:bodyPr wrap="square" lIns="91384" tIns="45691" rIns="91384" bIns="45691" rtlCol="0">
+            <a:spAutoFit/>
+          </a:bodyPr>
+          <a:lstStyle/>
+          <a:p>
+            <a:r>
+              <a:rPr lang="en-US" sz="600" u="sng" dirty="0" err="1"/>
+              <a:t>w</a:t>
+            </a:r>
+            <a:r>
+              <a:rPr lang="en-US" sz="600" u="sng" dirty="0" err="1" smtClean="0"/>
+              <a:t>allwart</a:t>
+            </a:r>
+            <a:r>
+              <a:rPr lang="en-US" sz="600" u="sng" dirty="0" smtClean="0"/>
+              <a:t> detached</a:t>
+            </a:r>
+            <a:endParaRPr lang="en-US" sz="600" dirty="0"/>
+          </a:p>
+          <a:p>
+            <a:r>
+              <a:rPr lang="en-US" sz="600" dirty="0" smtClean="0"/>
+              <a:t>  - </a:t>
+            </a:r>
+            <a:r>
+              <a:rPr lang="en-US" sz="600" dirty="0" smtClean="0"/>
+              <a:t>reset</a:t>
+            </a:r>
+            <a:endParaRPr lang="en-US" sz="600" baseline="-25000" dirty="0" smtClean="0"/>
+          </a:p>
+        </p:txBody>
+      </p:sp>
+      <p:sp>
+        <p:nvSpPr>
+          <p:cNvPr id="59" name="Rounded Rectangle 58"/>
+          <p:cNvSpPr/>
+          <p:nvPr/>
+        </p:nvSpPr>
+        <p:spPr>
+          <a:xfrm>
+            <a:off x="2216293" y="1711873"/>
+            <a:ext cx="946535" cy="228600"/>
+          </a:xfrm>
+          <a:prstGeom prst="roundRect">
+            <a:avLst/>
+          </a:prstGeom>
+        </p:spPr>
+        <p:style>
+          <a:lnRef idx="2">
+            <a:schemeClr val="accent1">
+              <a:shade val="50000"/>
+            </a:schemeClr>
+          </a:lnRef>
+          <a:fillRef idx="1">
+            <a:schemeClr val="accent1"/>
+          </a:fillRef>
+          <a:effectRef idx="0">
+            <a:schemeClr val="accent1"/>
+          </a:effectRef>
+          <a:fontRef idx="minor">
+            <a:schemeClr val="lt1"/>
+          </a:fontRef>
+        </p:style>
+        <p:txBody>
+          <a:bodyPr lIns="91384" tIns="45691" rIns="91384" bIns="45691" rtlCol="0" anchor="ctr"/>
+          <a:lstStyle/>
+          <a:p>
+            <a:pPr algn="ctr"/>
+            <a:r>
+              <a:rPr lang="en-US" sz="600" dirty="0" smtClean="0"/>
+              <a:t>Validating </a:t>
+            </a:r>
+            <a:r>
+              <a:rPr lang="en-US" sz="600" dirty="0" err="1" smtClean="0"/>
+              <a:t>Wallwart</a:t>
+            </a:r>
+            <a:endParaRPr lang="en-US" sz="600" dirty="0"/>
+          </a:p>
+        </p:txBody>
+      </p:sp>
+      <p:cxnSp>
+        <p:nvCxnSpPr>
+          <p:cNvPr id="75" name="Curved Connector 74"/>
+          <p:cNvCxnSpPr>
+            <a:stCxn id="59" idx="3"/>
+            <a:endCxn id="40" idx="3"/>
+          </p:cNvCxnSpPr>
+          <p:nvPr/>
+        </p:nvCxnSpPr>
+        <p:spPr>
+          <a:xfrm flipH="1">
+            <a:off x="2635058" y="1826173"/>
+            <a:ext cx="527770" cy="2376468"/>
+          </a:xfrm>
+          <a:prstGeom prst="curvedConnector3">
+            <a:avLst>
+              <a:gd name="adj1" fmla="val -43314"/>
+            </a:avLst>
           </a:prstGeom>
           <a:ln>
             <a:tailEnd type="arrow"/>
@@ -5930,22 +7386,20 @@
       </p:cxnSp>
       <p:cxnSp>
         <p:nvCxnSpPr>
-          <p:cNvPr id="292" name="Curved Connector 291"/>
+          <p:cNvPr id="76" name="Curved Connector 75"/>
           <p:cNvCxnSpPr>
-            <a:stCxn id="273" idx="2"/>
-            <a:endCxn id="302" idx="0"/>
+            <a:stCxn id="59" idx="3"/>
+            <a:endCxn id="54" idx="0"/>
           </p:cNvCxnSpPr>
           <p:nvPr/>
         </p:nvCxnSpPr>
         <p:spPr>
-          <a:xfrm rot="16200000" flipH="1">
-            <a:off x="8236395" y="5675697"/>
-            <a:ext cx="981468" cy="2167169"/>
-          </a:xfrm>
-          <a:prstGeom prst="curvedConnector3">
-            <a:avLst>
-              <a:gd name="adj1" fmla="val 50000"/>
-            </a:avLst>
+          <a:xfrm>
+            <a:off x="3162828" y="1826173"/>
+            <a:ext cx="964454" cy="665974"/>
+          </a:xfrm>
+          <a:prstGeom prst="curvedConnector2">
+            <a:avLst/>
           </a:prstGeom>
           <a:ln>
             <a:tailEnd type="arrow"/>
@@ -5968,14 +7422,14 @@
       </p:cxnSp>
       <p:sp>
         <p:nvSpPr>
-          <p:cNvPr id="293" name="TextBox 292"/>
+          <p:cNvPr id="77" name="TextBox 76"/>
           <p:cNvSpPr txBox="1"/>
           <p:nvPr/>
         </p:nvSpPr>
         <p:spPr>
           <a:xfrm>
-            <a:off x="8917629" y="6139997"/>
-            <a:ext cx="1066204" cy="461606"/>
+            <a:off x="2376116" y="3127604"/>
+            <a:ext cx="1370166" cy="276940"/>
           </a:xfrm>
           <a:prstGeom prst="rect">
             <a:avLst/>
@@ -5985,73 +7439,52 @@
           </a:solidFill>
         </p:spPr>
         <p:txBody>
-          <a:bodyPr wrap="none" lIns="91384" tIns="45691" rIns="91384" bIns="45691" rtlCol="0">
+          <a:bodyPr wrap="square" lIns="91384" tIns="45691" rIns="91384" bIns="45691" rtlCol="0">
             <a:spAutoFit/>
           </a:bodyPr>
           <a:lstStyle/>
           <a:p>
             <a:r>
+              <a:rPr lang="en-US" sz="600" u="sng" dirty="0" smtClean="0"/>
+              <a:t>INVALID</a:t>
+            </a:r>
+            <a:r>
+              <a:rPr lang="en-US" sz="600" u="sng" dirty="0" smtClean="0"/>
+              <a:t> </a:t>
+            </a:r>
+            <a:r>
               <a:rPr lang="en-US" sz="600" u="sng" dirty="0" err="1" smtClean="0"/>
-              <a:t>I</a:t>
-            </a:r>
-            <a:r>
-              <a:rPr lang="en-US" sz="600" u="sng" baseline="-25000" dirty="0" err="1" smtClean="0"/>
-              <a:t>sideB</a:t>
+              <a:t>wallwart</a:t>
             </a:r>
             <a:r>
               <a:rPr lang="en-US" sz="600" u="sng" dirty="0" smtClean="0"/>
-              <a:t> ~= 0</a:t>
+              <a:t> detected</a:t>
             </a:r>
             <a:endParaRPr lang="en-US" sz="600" u="sng" dirty="0"/>
           </a:p>
           <a:p>
             <a:r>
               <a:rPr lang="en-US" sz="600" dirty="0" smtClean="0"/>
-              <a:t>  - disconnect </a:t>
-            </a:r>
-            <a:r>
-              <a:rPr lang="en-US" sz="600" dirty="0" err="1" smtClean="0"/>
-              <a:t>sideB</a:t>
+              <a:t> </a:t>
+            </a:r>
+            <a:r>
+              <a:rPr lang="en-US" sz="600" dirty="0" smtClean="0"/>
+              <a:t>  - update the UI to indicate erring</a:t>
             </a:r>
             <a:endParaRPr lang="en-US" sz="600" dirty="0" smtClean="0"/>
           </a:p>
-          <a:p>
-            <a:r>
-              <a:rPr lang="en-US" sz="600" dirty="0"/>
-              <a:t> </a:t>
-            </a:r>
-            <a:r>
-              <a:rPr lang="en-US" sz="600" dirty="0" smtClean="0"/>
-              <a:t> - connect </a:t>
-            </a:r>
-            <a:r>
-              <a:rPr lang="en-US" sz="600" dirty="0" err="1" smtClean="0"/>
-              <a:t>sideA</a:t>
-            </a:r>
-            <a:endParaRPr lang="en-US" sz="600" dirty="0" smtClean="0"/>
-          </a:p>
-          <a:p>
-            <a:r>
-              <a:rPr lang="en-US" sz="600" dirty="0"/>
-              <a:t> </a:t>
-            </a:r>
-            <a:r>
-              <a:rPr lang="en-US" sz="600" dirty="0" smtClean="0"/>
-              <a:t> - start balance timer (~10s)</a:t>
-            </a:r>
-          </a:p>
-        </p:txBody>
-      </p:sp>
-      <p:sp>
-        <p:nvSpPr>
-          <p:cNvPr id="294" name="TextBox 293"/>
+        </p:txBody>
+      </p:sp>
+      <p:sp>
+        <p:nvSpPr>
+          <p:cNvPr id="78" name="TextBox 77"/>
           <p:cNvSpPr txBox="1"/>
           <p:nvPr/>
         </p:nvSpPr>
         <p:spPr>
           <a:xfrm>
-            <a:off x="8203370" y="6659316"/>
-            <a:ext cx="1155698" cy="461606"/>
+            <a:off x="3571670" y="1627766"/>
+            <a:ext cx="1370166" cy="461606"/>
           </a:xfrm>
           <a:prstGeom prst="rect">
             <a:avLst/>
@@ -6067,29 +7500,22 @@
           <a:lstStyle/>
           <a:p>
             <a:r>
+              <a:rPr lang="en-US" sz="600" u="sng" dirty="0"/>
+              <a:t>v</a:t>
+            </a:r>
+            <a:r>
+              <a:rPr lang="en-US" sz="600" u="sng" dirty="0" smtClean="0"/>
+              <a:t>alid </a:t>
+            </a:r>
+            <a:r>
               <a:rPr lang="en-US" sz="600" u="sng" dirty="0" err="1" smtClean="0"/>
-              <a:t>I</a:t>
-            </a:r>
-            <a:r>
-              <a:rPr lang="en-US" sz="600" u="sng" baseline="-25000" dirty="0" err="1" smtClean="0"/>
-              <a:t>sideA</a:t>
+              <a:t>wallwart</a:t>
             </a:r>
             <a:r>
               <a:rPr lang="en-US" sz="600" u="sng" dirty="0" smtClean="0"/>
-              <a:t> ~= 0</a:t>
+              <a:t> detected</a:t>
             </a:r>
             <a:endParaRPr lang="en-US" sz="600" u="sng" dirty="0"/>
-          </a:p>
-          <a:p>
-            <a:r>
-              <a:rPr lang="en-US" sz="600" dirty="0" smtClean="0"/>
-              <a:t>  - disconnect </a:t>
-            </a:r>
-            <a:r>
-              <a:rPr lang="en-US" sz="600" dirty="0" err="1" smtClean="0"/>
-              <a:t>sideA</a:t>
-            </a:r>
-            <a:endParaRPr lang="en-US" sz="600" dirty="0" smtClean="0"/>
           </a:p>
           <a:p>
             <a:r>
@@ -6098,43 +7524,61 @@
             </a:r>
             <a:r>
               <a:rPr lang="en-US" sz="600" dirty="0" smtClean="0"/>
-              <a:t> - connect </a:t>
-            </a:r>
-            <a:r>
-              <a:rPr lang="en-US" sz="600" dirty="0" err="1" smtClean="0"/>
-              <a:t>sideB</a:t>
-            </a:r>
-            <a:endParaRPr lang="en-US" sz="600" dirty="0" smtClean="0"/>
-          </a:p>
-          <a:p>
+              <a:t> </a:t>
+            </a:r>
+            <a:r>
+              <a:rPr lang="en-US" sz="600" dirty="0" smtClean="0"/>
+              <a:t>- update UI state to indicate waiting</a:t>
+            </a:r>
+          </a:p>
+          <a:p>
+            <a:r>
+              <a:rPr lang="en-US" sz="600" dirty="0" smtClean="0"/>
+              <a:t>  - </a:t>
+            </a:r>
+            <a:r>
+              <a:rPr lang="en-US" sz="600" dirty="0" err="1"/>
+              <a:t>I</a:t>
+            </a:r>
+            <a:r>
+              <a:rPr lang="en-US" sz="600" baseline="-25000" dirty="0" err="1"/>
+              <a:t>charge,max</a:t>
+            </a:r>
             <a:r>
               <a:rPr lang="en-US" sz="600" dirty="0"/>
-              <a:t> </a:t>
+              <a:t> = min(0.1/h*C, 3A/side)</a:t>
+            </a:r>
+          </a:p>
+          <a:p>
+            <a:r>
+              <a:rPr lang="en-US" sz="600" dirty="0"/>
+              <a:t>  - configure </a:t>
             </a:r>
             <a:r>
               <a:rPr lang="en-US" sz="600" dirty="0" smtClean="0"/>
-              <a:t> - start balance timer (~10s)</a:t>
-            </a:r>
+              <a:t>charger</a:t>
+            </a:r>
+            <a:endParaRPr lang="en-US" sz="600" dirty="0"/>
           </a:p>
         </p:txBody>
       </p:sp>
       <p:cxnSp>
         <p:nvCxnSpPr>
-          <p:cNvPr id="297" name="Curved Connector 296"/>
+          <p:cNvPr id="83" name="Curved Connector 82"/>
           <p:cNvCxnSpPr>
-            <a:stCxn id="302" idx="2"/>
-            <a:endCxn id="328" idx="0"/>
+            <a:stCxn id="273" idx="2"/>
+            <a:endCxn id="40" idx="2"/>
           </p:cNvCxnSpPr>
           <p:nvPr/>
         </p:nvCxnSpPr>
         <p:spPr>
-          <a:xfrm rot="16200000" flipH="1">
-            <a:off x="10098557" y="7190772"/>
-            <a:ext cx="882651" cy="1458337"/>
+          <a:xfrm rot="5400000" flipH="1">
+            <a:off x="3968653" y="2593657"/>
+            <a:ext cx="1938167" cy="5411616"/>
           </a:xfrm>
           <a:prstGeom prst="curvedConnector3">
             <a:avLst>
-              <a:gd name="adj1" fmla="val 50000"/>
+              <a:gd name="adj1" fmla="val -149399"/>
             </a:avLst>
           </a:prstGeom>
           <a:ln>
@@ -6158,14 +7602,14 @@
       </p:cxnSp>
       <p:sp>
         <p:nvSpPr>
-          <p:cNvPr id="298" name="TextBox 297"/>
+          <p:cNvPr id="84" name="TextBox 83"/>
           <p:cNvSpPr txBox="1"/>
           <p:nvPr/>
         </p:nvSpPr>
         <p:spPr>
           <a:xfrm>
-            <a:off x="9791664" y="7756524"/>
-            <a:ext cx="1371600" cy="369273"/>
+            <a:off x="6248400" y="8391030"/>
+            <a:ext cx="1193061" cy="369273"/>
           </a:xfrm>
           <a:prstGeom prst="rect">
             <a:avLst/>
@@ -6181,1460 +7625,76 @@
           <a:lstStyle/>
           <a:p>
             <a:r>
+              <a:rPr lang="en-US" sz="600" u="sng" dirty="0" err="1" smtClean="0"/>
+              <a:t>V</a:t>
+            </a:r>
+            <a:r>
+              <a:rPr lang="en-US" sz="600" u="sng" baseline="-25000" dirty="0" err="1" smtClean="0"/>
+              <a:t>sideA</a:t>
+            </a:r>
+            <a:r>
               <a:rPr lang="en-US" sz="600" u="sng" dirty="0" smtClean="0"/>
-              <a:t>balance timer expired</a:t>
-            </a:r>
-            <a:endParaRPr lang="en-US" sz="600" u="sng" dirty="0"/>
-          </a:p>
-          <a:p>
+              <a:t> &lt; 10V OR </a:t>
+            </a:r>
+            <a:r>
+              <a:rPr lang="en-US" sz="600" u="sng" dirty="0" err="1" smtClean="0"/>
+              <a:t>V</a:t>
+            </a:r>
+            <a:r>
+              <a:rPr lang="en-US" sz="600" u="sng" baseline="-25000" dirty="0" err="1" smtClean="0"/>
+              <a:t>sideB</a:t>
+            </a:r>
+            <a:r>
+              <a:rPr lang="en-US" sz="600" u="sng" dirty="0"/>
+              <a:t> </a:t>
+            </a:r>
+            <a:r>
+              <a:rPr lang="en-US" sz="600" u="sng" dirty="0" smtClean="0"/>
+              <a:t>&lt; </a:t>
+            </a:r>
             <a:r>
               <a:rPr lang="en-US" sz="600" dirty="0" smtClean="0"/>
-              <a:t>  - start balance-check timer (~100ms)</a:t>
-            </a:r>
-          </a:p>
-          <a:p>
+              <a:t>10V</a:t>
+            </a:r>
+          </a:p>
+          <a:p>
+            <a:r>
+              <a:rPr lang="en-US" sz="600" dirty="0" smtClean="0"/>
+              <a:t>  </a:t>
+            </a:r>
+            <a:r>
+              <a:rPr lang="en-US" sz="600" dirty="0" smtClean="0"/>
+              <a:t>- </a:t>
+            </a:r>
+            <a:r>
+              <a:rPr lang="en-US" sz="600" dirty="0" smtClean="0"/>
+              <a:t>disconnect everything</a:t>
+            </a:r>
             <a:r>
               <a:rPr lang="en-US" sz="600" dirty="0"/>
               <a:t> </a:t>
             </a:r>
+            <a:endParaRPr lang="en-US" sz="600" dirty="0" smtClean="0"/>
+          </a:p>
+          <a:p>
             <a:r>
               <a:rPr lang="en-US" sz="600" dirty="0" smtClean="0"/>
-              <a:t> - connect </a:t>
-            </a:r>
-            <a:r>
-              <a:rPr lang="en-US" sz="600" dirty="0" err="1" smtClean="0"/>
-              <a:t>sideA</a:t>
-            </a:r>
-            <a:r>
-              <a:rPr lang="en-US" sz="600" dirty="0" smtClean="0"/>
-              <a:t> and </a:t>
-            </a:r>
-            <a:r>
-              <a:rPr lang="en-US" sz="600" dirty="0" err="1" smtClean="0"/>
-              <a:t>sideB</a:t>
-            </a:r>
-            <a:endParaRPr lang="en-US" sz="600" dirty="0" smtClean="0"/>
-          </a:p>
-        </p:txBody>
-      </p:sp>
-      <p:cxnSp>
-        <p:nvCxnSpPr>
-          <p:cNvPr id="299" name="Curved Connector 298"/>
-          <p:cNvCxnSpPr/>
-          <p:nvPr/>
-        </p:nvCxnSpPr>
-        <p:spPr>
-          <a:xfrm rot="5400000" flipH="1">
-            <a:off x="8493070" y="1712552"/>
-            <a:ext cx="114300" cy="381000"/>
-          </a:xfrm>
-          <a:prstGeom prst="curvedConnector4">
-            <a:avLst>
-              <a:gd name="adj1" fmla="val -405556"/>
-              <a:gd name="adj2" fmla="val 181667"/>
-            </a:avLst>
-          </a:prstGeom>
-          <a:ln>
-            <a:tailEnd type="arrow"/>
-          </a:ln>
-        </p:spPr>
-        <p:style>
-          <a:lnRef idx="1">
-            <a:schemeClr val="accent1"/>
-          </a:lnRef>
-          <a:fillRef idx="0">
-            <a:schemeClr val="accent1"/>
-          </a:fillRef>
-          <a:effectRef idx="0">
-            <a:schemeClr val="accent1"/>
-          </a:effectRef>
-          <a:fontRef idx="minor">
-            <a:schemeClr val="tx1"/>
-          </a:fontRef>
-        </p:style>
-      </p:cxnSp>
-      <p:sp>
-        <p:nvSpPr>
-          <p:cNvPr id="300" name="TextBox 299"/>
+              <a:t>  -update UI to indicate erring</a:t>
+            </a:r>
+            <a:endParaRPr lang="en-US" sz="600" baseline="-25000" dirty="0"/>
+          </a:p>
+        </p:txBody>
+      </p:sp>
+      <p:sp>
+        <p:nvSpPr>
+          <p:cNvPr id="87" name="TextBox 86"/>
           <p:cNvSpPr txBox="1"/>
           <p:nvPr/>
         </p:nvSpPr>
         <p:spPr>
           <a:xfrm>
-            <a:off x="8174577" y="2339704"/>
-            <a:ext cx="2017137" cy="553939"/>
-          </a:xfrm>
-          <a:prstGeom prst="rect">
-            <a:avLst/>
-          </a:prstGeom>
-          <a:solidFill>
-            <a:schemeClr val="bg1"/>
-          </a:solidFill>
-        </p:spPr>
-        <p:txBody>
-          <a:bodyPr wrap="square" lIns="91384" tIns="45691" rIns="91384" bIns="45691" rtlCol="0">
-            <a:spAutoFit/>
-          </a:bodyPr>
-          <a:lstStyle/>
-          <a:p>
-            <a:r>
-              <a:rPr lang="en-US" sz="600" u="sng" dirty="0"/>
-              <a:t>c</a:t>
-            </a:r>
-            <a:r>
-              <a:rPr lang="en-US" sz="600" u="sng" dirty="0" smtClean="0"/>
-              <a:t>harger-refresh </a:t>
-            </a:r>
-            <a:r>
-              <a:rPr lang="en-US" sz="600" u="sng" dirty="0"/>
-              <a:t>timer </a:t>
-            </a:r>
-            <a:r>
-              <a:rPr lang="en-US" sz="600" u="sng" dirty="0" smtClean="0"/>
-              <a:t>expired</a:t>
-            </a:r>
-            <a:endParaRPr lang="en-US" sz="600" dirty="0"/>
-          </a:p>
-          <a:p>
-            <a:r>
-              <a:rPr lang="en-US" sz="600" dirty="0" smtClean="0"/>
-              <a:t>  - start the charger refresh timer (~10s)</a:t>
-            </a:r>
-          </a:p>
-          <a:p>
-            <a:r>
-              <a:rPr lang="en-US" sz="600" dirty="0"/>
-              <a:t> </a:t>
-            </a:r>
-            <a:r>
-              <a:rPr lang="en-US" sz="600" dirty="0" smtClean="0"/>
-              <a:t> - increment </a:t>
-            </a:r>
-            <a:r>
-              <a:rPr lang="en-US" sz="600" dirty="0"/>
-              <a:t>the overall </a:t>
-            </a:r>
-            <a:r>
-              <a:rPr lang="en-US" sz="600" dirty="0" smtClean="0"/>
-              <a:t>current </a:t>
-            </a:r>
-            <a:r>
-              <a:rPr lang="en-US" sz="600" dirty="0"/>
-              <a:t>(</a:t>
-            </a:r>
-            <a:r>
-              <a:rPr lang="en-US" sz="600" dirty="0" err="1"/>
-              <a:t>I</a:t>
-            </a:r>
-            <a:r>
-              <a:rPr lang="en-US" sz="600" baseline="-25000" dirty="0" err="1"/>
-              <a:t>charge,max</a:t>
-            </a:r>
-            <a:r>
-              <a:rPr lang="en-US" sz="600" dirty="0" smtClean="0"/>
-              <a:t>) to slowly float</a:t>
-            </a:r>
-          </a:p>
-          <a:p>
-            <a:r>
-              <a:rPr lang="en-US" sz="600" dirty="0"/>
-              <a:t> </a:t>
-            </a:r>
-            <a:r>
-              <a:rPr lang="en-US" sz="600" dirty="0" smtClean="0"/>
-              <a:t>    up to the maximum in case it was ever decremented</a:t>
-            </a:r>
-          </a:p>
-          <a:p>
-            <a:r>
-              <a:rPr lang="en-US" sz="600" dirty="0" smtClean="0"/>
-              <a:t>  - configure charger with potentially updated </a:t>
-            </a:r>
-            <a:r>
-              <a:rPr lang="en-US" sz="600" dirty="0" err="1" smtClean="0"/>
-              <a:t>I</a:t>
-            </a:r>
-            <a:r>
-              <a:rPr lang="en-US" sz="600" baseline="-25000" dirty="0" err="1" smtClean="0"/>
-              <a:t>charge,max</a:t>
-            </a:r>
-            <a:endParaRPr lang="en-US" sz="600" baseline="-25000" dirty="0" smtClean="0"/>
-          </a:p>
-        </p:txBody>
-      </p:sp>
-      <p:sp>
-        <p:nvSpPr>
-          <p:cNvPr id="302" name="Rounded Rectangle 301"/>
-          <p:cNvSpPr/>
-          <p:nvPr/>
-        </p:nvSpPr>
-        <p:spPr>
-          <a:xfrm>
-            <a:off x="9429714" y="7250016"/>
-            <a:ext cx="762000" cy="228600"/>
-          </a:xfrm>
-          <a:prstGeom prst="roundRect">
-            <a:avLst/>
-          </a:prstGeom>
-        </p:spPr>
-        <p:style>
-          <a:lnRef idx="2">
-            <a:schemeClr val="accent1">
-              <a:shade val="50000"/>
-            </a:schemeClr>
-          </a:lnRef>
-          <a:fillRef idx="1">
-            <a:schemeClr val="accent1"/>
-          </a:fillRef>
-          <a:effectRef idx="0">
-            <a:schemeClr val="accent1"/>
-          </a:effectRef>
-          <a:fontRef idx="minor">
-            <a:schemeClr val="lt1"/>
-          </a:fontRef>
-        </p:style>
-        <p:txBody>
-          <a:bodyPr lIns="91384" tIns="45691" rIns="91384" bIns="45691" rtlCol="0" anchor="ctr"/>
-          <a:lstStyle/>
-          <a:p>
-            <a:pPr algn="ctr"/>
-            <a:r>
-              <a:rPr lang="en-US" sz="600" dirty="0" smtClean="0"/>
-              <a:t>Balancing</a:t>
-            </a:r>
-            <a:endParaRPr lang="en-US" sz="600" dirty="0"/>
-          </a:p>
-        </p:txBody>
-      </p:sp>
-      <p:cxnSp>
-        <p:nvCxnSpPr>
-          <p:cNvPr id="308" name="Curved Connector 307"/>
-          <p:cNvCxnSpPr>
-            <a:stCxn id="302" idx="2"/>
-            <a:endCxn id="277" idx="2"/>
-          </p:cNvCxnSpPr>
-          <p:nvPr/>
-        </p:nvCxnSpPr>
-        <p:spPr>
-          <a:xfrm rot="5400000" flipH="1">
-            <a:off x="6551765" y="4219668"/>
-            <a:ext cx="511173" cy="6006724"/>
-          </a:xfrm>
-          <a:prstGeom prst="curvedConnector3">
-            <a:avLst>
-              <a:gd name="adj1" fmla="val -175902"/>
-            </a:avLst>
-          </a:prstGeom>
-          <a:ln>
-            <a:tailEnd type="arrow"/>
-          </a:ln>
-        </p:spPr>
-        <p:style>
-          <a:lnRef idx="1">
-            <a:schemeClr val="accent1"/>
-          </a:lnRef>
-          <a:fillRef idx="0">
-            <a:schemeClr val="accent1"/>
-          </a:fillRef>
-          <a:effectRef idx="0">
-            <a:schemeClr val="accent1"/>
-          </a:effectRef>
-          <a:fontRef idx="minor">
-            <a:schemeClr val="tx1"/>
-          </a:fontRef>
-        </p:style>
-      </p:cxnSp>
-      <p:sp>
-        <p:nvSpPr>
-          <p:cNvPr id="312" name="TextBox 311"/>
-          <p:cNvSpPr txBox="1"/>
-          <p:nvPr/>
-        </p:nvSpPr>
-        <p:spPr>
-          <a:xfrm>
-            <a:off x="7749620" y="7941160"/>
-            <a:ext cx="1228108" cy="369273"/>
-          </a:xfrm>
-          <a:prstGeom prst="rect">
-            <a:avLst/>
-          </a:prstGeom>
-          <a:solidFill>
-            <a:schemeClr val="bg1"/>
-          </a:solidFill>
-        </p:spPr>
-        <p:txBody>
-          <a:bodyPr wrap="none" lIns="91384" tIns="45691" rIns="91384" bIns="45691" rtlCol="0">
-            <a:spAutoFit/>
-          </a:bodyPr>
-          <a:lstStyle/>
-          <a:p>
-            <a:r>
-              <a:rPr lang="en-US" sz="600" u="sng" dirty="0" smtClean="0"/>
-              <a:t>3A </a:t>
-            </a:r>
-            <a:r>
-              <a:rPr lang="en-US" sz="600" u="sng" dirty="0"/>
-              <a:t>&lt; </a:t>
-            </a:r>
-            <a:r>
-              <a:rPr lang="en-US" sz="600" u="sng" dirty="0" err="1" smtClean="0"/>
-              <a:t>I</a:t>
-            </a:r>
-            <a:r>
-              <a:rPr lang="en-US" sz="600" u="sng" baseline="-25000" dirty="0" err="1" smtClean="0"/>
-              <a:t>sideA</a:t>
-            </a:r>
-            <a:r>
-              <a:rPr lang="en-US" sz="600" u="sng" dirty="0" smtClean="0"/>
-              <a:t> OR 3A </a:t>
-            </a:r>
-            <a:r>
-              <a:rPr lang="en-US" sz="600" u="sng" dirty="0"/>
-              <a:t>&lt; </a:t>
-            </a:r>
-            <a:r>
-              <a:rPr lang="en-US" sz="600" u="sng" dirty="0" err="1" smtClean="0"/>
-              <a:t>I</a:t>
-            </a:r>
-            <a:r>
-              <a:rPr lang="en-US" sz="600" u="sng" baseline="-25000" dirty="0" err="1" smtClean="0"/>
-              <a:t>sideB</a:t>
-            </a:r>
-            <a:endParaRPr lang="en-US" sz="600" u="sng" dirty="0"/>
-          </a:p>
-          <a:p>
-            <a:r>
-              <a:rPr lang="en-US" sz="600" dirty="0" smtClean="0"/>
-              <a:t>  - disconnect both sides</a:t>
-            </a:r>
-          </a:p>
-          <a:p>
-            <a:r>
-              <a:rPr lang="en-US" sz="600" dirty="0" smtClean="0"/>
-              <a:t>  - </a:t>
-            </a:r>
-            <a:r>
-              <a:rPr lang="en-US" sz="600" dirty="0"/>
-              <a:t>start </a:t>
-            </a:r>
-            <a:r>
-              <a:rPr lang="en-US" sz="600" dirty="0" err="1"/>
-              <a:t>cooldown</a:t>
-            </a:r>
-            <a:r>
-              <a:rPr lang="en-US" sz="600" dirty="0"/>
-              <a:t> </a:t>
-            </a:r>
-            <a:r>
-              <a:rPr lang="en-US" sz="600" dirty="0" smtClean="0"/>
-              <a:t>timer (~100ms)</a:t>
-            </a:r>
-            <a:endParaRPr lang="en-US" sz="600" dirty="0"/>
-          </a:p>
-        </p:txBody>
-      </p:sp>
-      <p:cxnSp>
-        <p:nvCxnSpPr>
-          <p:cNvPr id="314" name="Curved Connector 313"/>
-          <p:cNvCxnSpPr>
-            <a:stCxn id="328" idx="3"/>
-            <a:endCxn id="273" idx="0"/>
-          </p:cNvCxnSpPr>
-          <p:nvPr/>
-        </p:nvCxnSpPr>
-        <p:spPr>
-          <a:xfrm flipH="1" flipV="1">
-            <a:off x="7643545" y="6039948"/>
-            <a:ext cx="4006506" cy="2435619"/>
-          </a:xfrm>
-          <a:prstGeom prst="curvedConnector4">
-            <a:avLst>
-              <a:gd name="adj1" fmla="val -31763"/>
-              <a:gd name="adj2" fmla="val 107196"/>
-            </a:avLst>
-          </a:prstGeom>
-          <a:ln>
-            <a:tailEnd type="arrow"/>
-          </a:ln>
-        </p:spPr>
-        <p:style>
-          <a:lnRef idx="1">
-            <a:schemeClr val="accent1"/>
-          </a:lnRef>
-          <a:fillRef idx="0">
-            <a:schemeClr val="accent1"/>
-          </a:fillRef>
-          <a:effectRef idx="0">
-            <a:schemeClr val="accent1"/>
-          </a:effectRef>
-          <a:fontRef idx="minor">
-            <a:schemeClr val="tx1"/>
-          </a:fontRef>
-        </p:style>
-      </p:cxnSp>
-      <p:sp>
-        <p:nvSpPr>
-          <p:cNvPr id="313" name="TextBox 312"/>
-          <p:cNvSpPr txBox="1"/>
-          <p:nvPr/>
-        </p:nvSpPr>
-        <p:spPr>
-          <a:xfrm>
-            <a:off x="11963400" y="6139997"/>
-            <a:ext cx="1219770" cy="276940"/>
-          </a:xfrm>
-          <a:prstGeom prst="rect">
-            <a:avLst/>
-          </a:prstGeom>
-          <a:solidFill>
-            <a:schemeClr val="bg1"/>
-          </a:solidFill>
-        </p:spPr>
-        <p:txBody>
-          <a:bodyPr wrap="square" lIns="91384" tIns="45691" rIns="91384" bIns="45691" rtlCol="0">
-            <a:spAutoFit/>
-          </a:bodyPr>
-          <a:lstStyle/>
-          <a:p>
-            <a:r>
-              <a:rPr lang="en-US" sz="600" u="sng" dirty="0" smtClean="0"/>
-              <a:t>balance-check timer expired AND</a:t>
-            </a:r>
-          </a:p>
-          <a:p>
-            <a:r>
-              <a:rPr lang="en-US" sz="600" u="sng" dirty="0" smtClean="0"/>
-              <a:t>(0 &lt; </a:t>
-            </a:r>
-            <a:r>
-              <a:rPr lang="en-US" sz="600" u="sng" dirty="0" err="1" smtClean="0"/>
-              <a:t>I</a:t>
-            </a:r>
-            <a:r>
-              <a:rPr lang="en-US" sz="600" u="sng" baseline="-25000" dirty="0" err="1" smtClean="0"/>
-              <a:t>sideA</a:t>
-            </a:r>
-            <a:r>
-              <a:rPr lang="en-US" sz="600" u="sng" dirty="0" smtClean="0"/>
-              <a:t> AND 0 &lt; </a:t>
-            </a:r>
-            <a:r>
-              <a:rPr lang="en-US" sz="600" u="sng" dirty="0" err="1" smtClean="0"/>
-              <a:t>I</a:t>
-            </a:r>
-            <a:r>
-              <a:rPr lang="en-US" sz="600" u="sng" baseline="-25000" dirty="0" err="1" smtClean="0"/>
-              <a:t>sideB</a:t>
-            </a:r>
-            <a:r>
-              <a:rPr lang="en-US" sz="600" u="sng" dirty="0" smtClean="0"/>
-              <a:t>)</a:t>
-            </a:r>
-            <a:endParaRPr lang="en-US" sz="600" u="sng" dirty="0"/>
-          </a:p>
-        </p:txBody>
-      </p:sp>
-      <p:cxnSp>
-        <p:nvCxnSpPr>
-          <p:cNvPr id="318" name="Curved Connector 317"/>
-          <p:cNvCxnSpPr>
-            <a:stCxn id="328" idx="3"/>
-            <a:endCxn id="302" idx="0"/>
-          </p:cNvCxnSpPr>
-          <p:nvPr/>
-        </p:nvCxnSpPr>
-        <p:spPr>
-          <a:xfrm flipH="1" flipV="1">
-            <a:off x="9810714" y="7250016"/>
-            <a:ext cx="1839337" cy="1225551"/>
-          </a:xfrm>
-          <a:prstGeom prst="curvedConnector4">
-            <a:avLst>
-              <a:gd name="adj1" fmla="val -12428"/>
-              <a:gd name="adj2" fmla="val 118653"/>
-            </a:avLst>
-          </a:prstGeom>
-          <a:ln>
-            <a:tailEnd type="arrow"/>
-          </a:ln>
-        </p:spPr>
-        <p:style>
-          <a:lnRef idx="1">
-            <a:schemeClr val="accent1"/>
-          </a:lnRef>
-          <a:fillRef idx="0">
-            <a:schemeClr val="accent1"/>
-          </a:fillRef>
-          <a:effectRef idx="0">
-            <a:schemeClr val="accent1"/>
-          </a:effectRef>
-          <a:fontRef idx="minor">
-            <a:schemeClr val="tx1"/>
-          </a:fontRef>
-        </p:style>
-      </p:cxnSp>
-      <p:sp>
-        <p:nvSpPr>
-          <p:cNvPr id="326" name="TextBox 325"/>
-          <p:cNvSpPr txBox="1"/>
-          <p:nvPr/>
-        </p:nvSpPr>
-        <p:spPr>
-          <a:xfrm>
-            <a:off x="10888051" y="7133513"/>
-            <a:ext cx="1752600" cy="461606"/>
-          </a:xfrm>
-          <a:prstGeom prst="rect">
-            <a:avLst/>
-          </a:prstGeom>
-          <a:solidFill>
-            <a:schemeClr val="bg1"/>
-          </a:solidFill>
-        </p:spPr>
-        <p:txBody>
-          <a:bodyPr wrap="square" lIns="91384" tIns="45691" rIns="91384" bIns="45691" rtlCol="0">
-            <a:spAutoFit/>
-          </a:bodyPr>
-          <a:lstStyle/>
-          <a:p>
-            <a:r>
-              <a:rPr lang="en-US" sz="600" u="sng" dirty="0" smtClean="0"/>
-              <a:t>balance-check timer expired AND</a:t>
-            </a:r>
-          </a:p>
-          <a:p>
-            <a:r>
-              <a:rPr lang="en-US" sz="600" u="sng" dirty="0" smtClean="0"/>
-              <a:t>(</a:t>
-            </a:r>
-            <a:r>
-              <a:rPr lang="en-US" sz="600" u="sng" dirty="0" err="1" smtClean="0"/>
-              <a:t>I</a:t>
-            </a:r>
-            <a:r>
-              <a:rPr lang="en-US" sz="600" u="sng" baseline="-25000" dirty="0" err="1" smtClean="0"/>
-              <a:t>sideA</a:t>
-            </a:r>
-            <a:r>
-              <a:rPr lang="en-US" sz="600" u="sng" dirty="0" smtClean="0"/>
-              <a:t> &lt; 0 OR </a:t>
-            </a:r>
-            <a:r>
-              <a:rPr lang="en-US" sz="600" u="sng" dirty="0" err="1" smtClean="0"/>
-              <a:t>I</a:t>
-            </a:r>
-            <a:r>
-              <a:rPr lang="en-US" sz="600" u="sng" baseline="-25000" dirty="0" err="1" smtClean="0"/>
-              <a:t>sideB</a:t>
-            </a:r>
-            <a:r>
-              <a:rPr lang="en-US" sz="600" u="sng" dirty="0"/>
-              <a:t> </a:t>
-            </a:r>
-            <a:r>
-              <a:rPr lang="en-US" sz="600" u="sng" dirty="0" smtClean="0"/>
-              <a:t>&lt; 0)</a:t>
-            </a:r>
-          </a:p>
-          <a:p>
-            <a:r>
-              <a:rPr lang="en-US" sz="600" dirty="0"/>
-              <a:t> </a:t>
-            </a:r>
-            <a:r>
-              <a:rPr lang="en-US" sz="600" dirty="0" smtClean="0"/>
-              <a:t> - disconnect the side that is drawing no current</a:t>
-            </a:r>
-            <a:endParaRPr lang="en-US" sz="600" dirty="0"/>
-          </a:p>
-          <a:p>
-            <a:r>
-              <a:rPr lang="en-US" sz="600" dirty="0" smtClean="0"/>
-              <a:t>  -  start balance timer (~10s)</a:t>
-            </a:r>
-          </a:p>
-        </p:txBody>
-      </p:sp>
-      <p:sp>
-        <p:nvSpPr>
-          <p:cNvPr id="328" name="Rounded Rectangle 327"/>
-          <p:cNvSpPr/>
-          <p:nvPr/>
-        </p:nvSpPr>
-        <p:spPr>
-          <a:xfrm>
-            <a:off x="10888051" y="8361267"/>
-            <a:ext cx="762000" cy="228600"/>
-          </a:xfrm>
-          <a:prstGeom prst="roundRect">
-            <a:avLst/>
-          </a:prstGeom>
-        </p:spPr>
-        <p:style>
-          <a:lnRef idx="2">
-            <a:schemeClr val="accent1">
-              <a:shade val="50000"/>
-            </a:schemeClr>
-          </a:lnRef>
-          <a:fillRef idx="1">
-            <a:schemeClr val="accent1"/>
-          </a:fillRef>
-          <a:effectRef idx="0">
-            <a:schemeClr val="accent1"/>
-          </a:effectRef>
-          <a:fontRef idx="minor">
-            <a:schemeClr val="lt1"/>
-          </a:fontRef>
-        </p:style>
-        <p:txBody>
-          <a:bodyPr lIns="91384" tIns="45691" rIns="91384" bIns="45691" rtlCol="0" anchor="ctr"/>
-          <a:lstStyle/>
-          <a:p>
-            <a:pPr algn="ctr"/>
-            <a:r>
-              <a:rPr lang="en-US" sz="600" dirty="0" smtClean="0"/>
-              <a:t>Checking Balance</a:t>
-            </a:r>
-            <a:endParaRPr lang="en-US" sz="600" dirty="0"/>
-          </a:p>
-        </p:txBody>
-      </p:sp>
-      <p:sp>
-        <p:nvSpPr>
-          <p:cNvPr id="338" name="TextBox 337"/>
-          <p:cNvSpPr txBox="1"/>
-          <p:nvPr/>
-        </p:nvSpPr>
-        <p:spPr>
-          <a:xfrm>
-            <a:off x="11040451" y="8779360"/>
-            <a:ext cx="1447800" cy="276940"/>
-          </a:xfrm>
-          <a:prstGeom prst="rect">
-            <a:avLst/>
-          </a:prstGeom>
-          <a:solidFill>
-            <a:schemeClr val="bg1"/>
-          </a:solidFill>
-        </p:spPr>
-        <p:txBody>
-          <a:bodyPr wrap="square" lIns="91384" tIns="45691" rIns="91384" bIns="45691" rtlCol="0">
-            <a:spAutoFit/>
-          </a:bodyPr>
-          <a:lstStyle/>
-          <a:p>
-            <a:r>
-              <a:rPr lang="en-US" sz="600" dirty="0" smtClean="0">
-                <a:solidFill>
-                  <a:schemeClr val="accent3">
-                    <a:lumMod val="50000"/>
-                  </a:schemeClr>
-                </a:solidFill>
-              </a:rPr>
-              <a:t>Won’t catch overcurrent here, but short enough to be OK</a:t>
-            </a:r>
-            <a:endParaRPr lang="en-US" sz="600" dirty="0">
-              <a:solidFill>
-                <a:schemeClr val="accent3">
-                  <a:lumMod val="50000"/>
-                </a:schemeClr>
-              </a:solidFill>
-            </a:endParaRPr>
-          </a:p>
-        </p:txBody>
-      </p:sp>
-      <p:sp>
-        <p:nvSpPr>
-          <p:cNvPr id="40" name="Rounded Rectangle 39"/>
-          <p:cNvSpPr/>
-          <p:nvPr/>
-        </p:nvSpPr>
-        <p:spPr>
-          <a:xfrm>
-            <a:off x="1341715" y="4074900"/>
-            <a:ext cx="1293343" cy="255481"/>
-          </a:xfrm>
-          <a:prstGeom prst="roundRect">
-            <a:avLst/>
-          </a:prstGeom>
-        </p:spPr>
-        <p:style>
-          <a:lnRef idx="2">
-            <a:schemeClr val="accent1">
-              <a:shade val="50000"/>
-            </a:schemeClr>
-          </a:lnRef>
-          <a:fillRef idx="1">
-            <a:schemeClr val="accent1"/>
-          </a:fillRef>
-          <a:effectRef idx="0">
-            <a:schemeClr val="accent1"/>
-          </a:effectRef>
-          <a:fontRef idx="minor">
-            <a:schemeClr val="lt1"/>
-          </a:fontRef>
-        </p:style>
-        <p:txBody>
-          <a:bodyPr lIns="91384" tIns="45691" rIns="91384" bIns="45691" rtlCol="0" anchor="ctr"/>
-          <a:lstStyle/>
-          <a:p>
-            <a:pPr algn="ctr"/>
-            <a:r>
-              <a:rPr lang="en-US" sz="600" dirty="0" smtClean="0"/>
-              <a:t>Hanging</a:t>
-            </a:r>
-            <a:endParaRPr lang="en-US" sz="600" dirty="0"/>
-          </a:p>
-        </p:txBody>
-      </p:sp>
-      <p:sp>
-        <p:nvSpPr>
-          <p:cNvPr id="52" name="TextBox 51"/>
-          <p:cNvSpPr txBox="1"/>
-          <p:nvPr/>
-        </p:nvSpPr>
-        <p:spPr>
-          <a:xfrm>
-            <a:off x="1158897" y="3647361"/>
-            <a:ext cx="1447800" cy="276940"/>
-          </a:xfrm>
-          <a:prstGeom prst="rect">
-            <a:avLst/>
-          </a:prstGeom>
-          <a:solidFill>
-            <a:schemeClr val="bg1"/>
-          </a:solidFill>
-        </p:spPr>
-        <p:txBody>
-          <a:bodyPr wrap="square" lIns="91384" tIns="45691" rIns="91384" bIns="45691" rtlCol="0">
-            <a:spAutoFit/>
-          </a:bodyPr>
-          <a:lstStyle/>
-          <a:p>
-            <a:r>
-              <a:rPr lang="en-US" sz="600" dirty="0" smtClean="0">
-                <a:solidFill>
-                  <a:schemeClr val="accent3">
-                    <a:lumMod val="50000"/>
-                  </a:schemeClr>
-                </a:solidFill>
-              </a:rPr>
-              <a:t>This state is intended to indicate the need for human intervention</a:t>
-            </a:r>
-          </a:p>
-        </p:txBody>
-      </p:sp>
-      <p:sp>
-        <p:nvSpPr>
-          <p:cNvPr id="86" name="Rounded Rectangle 85"/>
-          <p:cNvSpPr/>
-          <p:nvPr/>
-        </p:nvSpPr>
-        <p:spPr>
-          <a:xfrm>
-            <a:off x="10401264" y="4760781"/>
-            <a:ext cx="762000" cy="228600"/>
-          </a:xfrm>
-          <a:prstGeom prst="roundRect">
-            <a:avLst/>
-          </a:prstGeom>
-        </p:spPr>
-        <p:style>
-          <a:lnRef idx="2">
-            <a:schemeClr val="accent1">
-              <a:shade val="50000"/>
-            </a:schemeClr>
-          </a:lnRef>
-          <a:fillRef idx="1">
-            <a:schemeClr val="accent1"/>
-          </a:fillRef>
-          <a:effectRef idx="0">
-            <a:schemeClr val="accent1"/>
-          </a:effectRef>
-          <a:fontRef idx="minor">
-            <a:schemeClr val="lt1"/>
-          </a:fontRef>
-        </p:style>
-        <p:txBody>
-          <a:bodyPr lIns="91384" tIns="45691" rIns="91384" bIns="45691" rtlCol="0" anchor="ctr"/>
-          <a:lstStyle/>
-          <a:p>
-            <a:pPr algn="ctr"/>
-            <a:r>
-              <a:rPr lang="en-US" sz="600" dirty="0" smtClean="0"/>
-              <a:t>Waiting</a:t>
-            </a:r>
-            <a:endParaRPr lang="en-US" sz="600" dirty="0"/>
-          </a:p>
-        </p:txBody>
-      </p:sp>
-      <p:cxnSp>
-        <p:nvCxnSpPr>
-          <p:cNvPr id="88" name="Curved Connector 87"/>
-          <p:cNvCxnSpPr>
-            <a:stCxn id="273" idx="3"/>
-            <a:endCxn id="86" idx="2"/>
-          </p:cNvCxnSpPr>
-          <p:nvPr/>
-        </p:nvCxnSpPr>
-        <p:spPr>
-          <a:xfrm flipV="1">
-            <a:off x="8024545" y="4989381"/>
-            <a:ext cx="2757719" cy="1164867"/>
-          </a:xfrm>
-          <a:prstGeom prst="curvedConnector2">
-            <a:avLst/>
-          </a:prstGeom>
-          <a:ln>
-            <a:tailEnd type="arrow"/>
-          </a:ln>
-        </p:spPr>
-        <p:style>
-          <a:lnRef idx="1">
-            <a:schemeClr val="accent1"/>
-          </a:lnRef>
-          <a:fillRef idx="0">
-            <a:schemeClr val="accent1"/>
-          </a:fillRef>
-          <a:effectRef idx="0">
-            <a:schemeClr val="accent1"/>
-          </a:effectRef>
-          <a:fontRef idx="minor">
-            <a:schemeClr val="tx1"/>
-          </a:fontRef>
-        </p:style>
-      </p:cxnSp>
-      <p:sp>
-        <p:nvSpPr>
-          <p:cNvPr id="82" name="TextBox 81"/>
-          <p:cNvSpPr txBox="1"/>
-          <p:nvPr/>
-        </p:nvSpPr>
-        <p:spPr>
-          <a:xfrm>
-            <a:off x="9429714" y="5264669"/>
-            <a:ext cx="1503825" cy="276940"/>
-          </a:xfrm>
-          <a:prstGeom prst="rect">
-            <a:avLst/>
-          </a:prstGeom>
-          <a:solidFill>
-            <a:schemeClr val="bg1"/>
-          </a:solidFill>
-        </p:spPr>
-        <p:txBody>
-          <a:bodyPr wrap="none" lIns="91384" tIns="45691" rIns="91384" bIns="45691" rtlCol="0">
-            <a:spAutoFit/>
-          </a:bodyPr>
-          <a:lstStyle/>
-          <a:p>
-            <a:r>
-              <a:rPr lang="en-US" sz="600" u="sng" dirty="0" err="1" smtClean="0"/>
-              <a:t>I</a:t>
-            </a:r>
-            <a:r>
-              <a:rPr lang="en-US" sz="600" u="sng" baseline="-25000" dirty="0" err="1" smtClean="0"/>
-              <a:t>sideA</a:t>
-            </a:r>
-            <a:r>
-              <a:rPr lang="en-US" sz="600" u="sng" dirty="0" smtClean="0"/>
-              <a:t> &lt; (0.1/h*C/2) AND </a:t>
-            </a:r>
-            <a:r>
-              <a:rPr lang="en-US" sz="600" u="sng" dirty="0" err="1" smtClean="0"/>
-              <a:t>I</a:t>
-            </a:r>
-            <a:r>
-              <a:rPr lang="en-US" sz="600" u="sng" baseline="-25000" dirty="0" err="1" smtClean="0"/>
-              <a:t>sideB</a:t>
-            </a:r>
-            <a:r>
-              <a:rPr lang="en-US" sz="600" u="sng" dirty="0" smtClean="0"/>
-              <a:t> </a:t>
-            </a:r>
-            <a:r>
-              <a:rPr lang="en-US" sz="600" u="sng" dirty="0"/>
-              <a:t>&lt; (</a:t>
-            </a:r>
-            <a:r>
-              <a:rPr lang="en-US" sz="600" u="sng" dirty="0" smtClean="0"/>
-              <a:t>0.1/h*C/2)</a:t>
-            </a:r>
-            <a:endParaRPr lang="en-US" sz="600" u="sng" dirty="0"/>
-          </a:p>
-          <a:p>
-            <a:r>
-              <a:rPr lang="en-US" sz="600" dirty="0" smtClean="0"/>
-              <a:t>  - disconnect both </a:t>
-            </a:r>
-            <a:r>
-              <a:rPr lang="en-US" sz="600" dirty="0" smtClean="0"/>
-              <a:t>sides</a:t>
-            </a:r>
-            <a:endParaRPr lang="en-US" sz="600" dirty="0" smtClean="0"/>
-          </a:p>
-        </p:txBody>
-      </p:sp>
-      <p:cxnSp>
-        <p:nvCxnSpPr>
-          <p:cNvPr id="96" name="Curved Connector 95"/>
-          <p:cNvCxnSpPr>
-            <a:stCxn id="86" idx="1"/>
-            <a:endCxn id="273" idx="0"/>
-          </p:cNvCxnSpPr>
-          <p:nvPr/>
-        </p:nvCxnSpPr>
-        <p:spPr>
-          <a:xfrm rot="10800000" flipV="1">
-            <a:off x="7643546" y="4875080"/>
-            <a:ext cx="2757719" cy="1164867"/>
-          </a:xfrm>
-          <a:prstGeom prst="curvedConnector2">
-            <a:avLst/>
-          </a:prstGeom>
-          <a:ln>
-            <a:tailEnd type="arrow"/>
-          </a:ln>
-        </p:spPr>
-        <p:style>
-          <a:lnRef idx="1">
-            <a:schemeClr val="accent1"/>
-          </a:lnRef>
-          <a:fillRef idx="0">
-            <a:schemeClr val="accent1"/>
-          </a:fillRef>
-          <a:effectRef idx="0">
-            <a:schemeClr val="accent1"/>
-          </a:effectRef>
-          <a:fontRef idx="minor">
-            <a:schemeClr val="tx1"/>
-          </a:fontRef>
-        </p:style>
-      </p:cxnSp>
-      <p:sp>
-        <p:nvSpPr>
-          <p:cNvPr id="92" name="TextBox 91"/>
-          <p:cNvSpPr txBox="1"/>
-          <p:nvPr/>
-        </p:nvSpPr>
-        <p:spPr>
-          <a:xfrm>
-            <a:off x="8338639" y="4803063"/>
-            <a:ext cx="1422071" cy="461606"/>
-          </a:xfrm>
-          <a:prstGeom prst="rect">
-            <a:avLst/>
-          </a:prstGeom>
-          <a:solidFill>
-            <a:schemeClr val="bg1"/>
-          </a:solidFill>
-        </p:spPr>
-        <p:txBody>
-          <a:bodyPr wrap="none" lIns="91384" tIns="45691" rIns="91384" bIns="45691" rtlCol="0">
-            <a:spAutoFit/>
-          </a:bodyPr>
-          <a:lstStyle/>
-          <a:p>
-            <a:r>
-              <a:rPr lang="en-US" sz="600" u="sng" dirty="0" err="1" smtClean="0"/>
-              <a:t>V</a:t>
-            </a:r>
-            <a:r>
-              <a:rPr lang="en-US" sz="600" u="sng" baseline="-25000" dirty="0" err="1" smtClean="0"/>
-              <a:t>sideA</a:t>
-            </a:r>
-            <a:r>
-              <a:rPr lang="en-US" sz="600" u="sng" dirty="0" smtClean="0"/>
-              <a:t> &lt; (</a:t>
-            </a:r>
-            <a:r>
-              <a:rPr lang="en-US" sz="600" u="sng" dirty="0" smtClean="0"/>
-              <a:t>4.1V/cell</a:t>
-            </a:r>
-            <a:r>
-              <a:rPr lang="en-US" sz="600" u="sng" dirty="0" smtClean="0"/>
-              <a:t>) OR </a:t>
-            </a:r>
-            <a:r>
-              <a:rPr lang="en-US" sz="600" u="sng" dirty="0" err="1" smtClean="0"/>
-              <a:t>V</a:t>
-            </a:r>
-            <a:r>
-              <a:rPr lang="en-US" sz="600" u="sng" baseline="-25000" dirty="0" err="1" smtClean="0"/>
-              <a:t>sideB</a:t>
-            </a:r>
-            <a:r>
-              <a:rPr lang="en-US" sz="600" u="sng" dirty="0" smtClean="0"/>
-              <a:t> </a:t>
-            </a:r>
-            <a:r>
-              <a:rPr lang="en-US" sz="600" u="sng" dirty="0"/>
-              <a:t>&lt; </a:t>
-            </a:r>
-            <a:r>
-              <a:rPr lang="en-US" sz="600" u="sng" dirty="0" smtClean="0"/>
-              <a:t>(</a:t>
-            </a:r>
-            <a:r>
-              <a:rPr lang="en-US" sz="600" u="sng" dirty="0" smtClean="0"/>
-              <a:t>4.1V/cell</a:t>
-            </a:r>
-            <a:r>
-              <a:rPr lang="en-US" sz="600" u="sng" dirty="0" smtClean="0"/>
-              <a:t>)</a:t>
-            </a:r>
-            <a:endParaRPr lang="en-US" sz="600" dirty="0" smtClean="0"/>
-          </a:p>
-          <a:p>
-            <a:r>
-              <a:rPr lang="en-US" sz="600" dirty="0" smtClean="0"/>
-              <a:t>  - turn on charging IC</a:t>
-            </a:r>
-          </a:p>
-          <a:p>
-            <a:r>
-              <a:rPr lang="en-US" sz="600" dirty="0"/>
-              <a:t> </a:t>
-            </a:r>
-            <a:r>
-              <a:rPr lang="en-US" sz="600" dirty="0" smtClean="0"/>
-              <a:t> - configure charging IC</a:t>
-            </a:r>
-          </a:p>
-          <a:p>
-            <a:r>
-              <a:rPr lang="en-US" sz="600" dirty="0"/>
-              <a:t> </a:t>
-            </a:r>
-            <a:r>
-              <a:rPr lang="en-US" sz="600" dirty="0" smtClean="0"/>
-              <a:t> - connect both sides</a:t>
-            </a:r>
-          </a:p>
-        </p:txBody>
-      </p:sp>
-      <p:sp>
-        <p:nvSpPr>
-          <p:cNvPr id="53" name="TextBox 52"/>
-          <p:cNvSpPr txBox="1"/>
-          <p:nvPr/>
-        </p:nvSpPr>
-        <p:spPr>
-          <a:xfrm>
-            <a:off x="8390200" y="4663984"/>
-            <a:ext cx="1256598" cy="184607"/>
-          </a:xfrm>
-          <a:prstGeom prst="rect">
-            <a:avLst/>
-          </a:prstGeom>
-          <a:solidFill>
-            <a:schemeClr val="bg1"/>
-          </a:solidFill>
-        </p:spPr>
-        <p:txBody>
-          <a:bodyPr wrap="square" lIns="91384" tIns="45691" rIns="91384" bIns="45691" rtlCol="0">
-            <a:spAutoFit/>
-          </a:bodyPr>
-          <a:lstStyle/>
-          <a:p>
-            <a:r>
-              <a:rPr lang="en-US" sz="600" dirty="0">
-                <a:solidFill>
-                  <a:schemeClr val="accent3">
-                    <a:lumMod val="50000"/>
-                  </a:schemeClr>
-                </a:solidFill>
-              </a:rPr>
-              <a:t>g</a:t>
-            </a:r>
-            <a:r>
-              <a:rPr lang="en-US" sz="600" dirty="0" smtClean="0">
-                <a:solidFill>
-                  <a:schemeClr val="accent3">
-                    <a:lumMod val="50000"/>
-                  </a:schemeClr>
-                </a:solidFill>
-              </a:rPr>
-              <a:t>o back for</a:t>
-            </a:r>
-            <a:r>
-              <a:rPr lang="en-US" sz="600" dirty="0" smtClean="0">
-                <a:solidFill>
-                  <a:schemeClr val="accent3">
-                    <a:lumMod val="50000"/>
-                  </a:schemeClr>
-                </a:solidFill>
-              </a:rPr>
-              <a:t> a topping charge</a:t>
-            </a:r>
-            <a:endParaRPr lang="en-US" sz="600" dirty="0">
-              <a:solidFill>
-                <a:schemeClr val="accent3">
-                  <a:lumMod val="50000"/>
-                </a:schemeClr>
-              </a:solidFill>
-            </a:endParaRPr>
-          </a:p>
-        </p:txBody>
-      </p:sp>
-      <p:sp>
-        <p:nvSpPr>
-          <p:cNvPr id="55" name="Rounded Rectangle 54"/>
-          <p:cNvSpPr/>
-          <p:nvPr/>
-        </p:nvSpPr>
-        <p:spPr>
-          <a:xfrm>
-            <a:off x="3746282" y="2502373"/>
-            <a:ext cx="866139" cy="228600"/>
-          </a:xfrm>
-          <a:prstGeom prst="roundRect">
-            <a:avLst/>
-          </a:prstGeom>
-        </p:spPr>
-        <p:style>
-          <a:lnRef idx="2">
-            <a:schemeClr val="accent1">
-              <a:shade val="50000"/>
-            </a:schemeClr>
-          </a:lnRef>
-          <a:fillRef idx="1">
-            <a:schemeClr val="accent1"/>
-          </a:fillRef>
-          <a:effectRef idx="0">
-            <a:schemeClr val="accent1"/>
-          </a:effectRef>
-          <a:fontRef idx="minor">
-            <a:schemeClr val="lt1"/>
-          </a:fontRef>
-        </p:style>
-        <p:txBody>
-          <a:bodyPr lIns="91384" tIns="45691" rIns="91384" bIns="45691" rtlCol="0" anchor="ctr"/>
-          <a:lstStyle/>
-          <a:p>
-            <a:pPr algn="ctr"/>
-            <a:r>
-              <a:rPr lang="en-US" sz="600" dirty="0" err="1" smtClean="0"/>
-              <a:t>PursuingMate</a:t>
-            </a:r>
-            <a:endParaRPr lang="en-US" sz="600" dirty="0" smtClean="0"/>
-          </a:p>
-        </p:txBody>
-      </p:sp>
-      <p:cxnSp>
-        <p:nvCxnSpPr>
-          <p:cNvPr id="57" name="Curved Connector 56"/>
-          <p:cNvCxnSpPr>
-            <a:stCxn id="55" idx="3"/>
-            <a:endCxn id="287" idx="0"/>
-          </p:cNvCxnSpPr>
-          <p:nvPr/>
-        </p:nvCxnSpPr>
-        <p:spPr>
-          <a:xfrm>
-            <a:off x="4612421" y="2616673"/>
-            <a:ext cx="1162566" cy="1193328"/>
-          </a:xfrm>
-          <a:prstGeom prst="curvedConnector2">
-            <a:avLst/>
-          </a:prstGeom>
-          <a:ln>
-            <a:tailEnd type="arrow"/>
-          </a:ln>
-        </p:spPr>
-        <p:style>
-          <a:lnRef idx="1">
-            <a:schemeClr val="accent1"/>
-          </a:lnRef>
-          <a:fillRef idx="0">
-            <a:schemeClr val="accent1"/>
-          </a:fillRef>
-          <a:effectRef idx="0">
-            <a:schemeClr val="accent1"/>
-          </a:effectRef>
-          <a:fontRef idx="minor">
-            <a:schemeClr val="tx1"/>
-          </a:fontRef>
-        </p:style>
-      </p:cxnSp>
-      <p:sp>
-        <p:nvSpPr>
-          <p:cNvPr id="285" name="TextBox 284"/>
-          <p:cNvSpPr txBox="1"/>
-          <p:nvPr/>
-        </p:nvSpPr>
-        <p:spPr>
-          <a:xfrm>
-            <a:off x="2514600" y="1371599"/>
-            <a:ext cx="1444513" cy="646272"/>
-          </a:xfrm>
-          <a:prstGeom prst="rect">
-            <a:avLst/>
-          </a:prstGeom>
-          <a:solidFill>
-            <a:schemeClr val="bg1"/>
-          </a:solidFill>
-        </p:spPr>
-        <p:txBody>
-          <a:bodyPr wrap="none" lIns="91384" tIns="45691" rIns="91384" bIns="45691" rtlCol="0">
-            <a:spAutoFit/>
-          </a:bodyPr>
-          <a:lstStyle/>
-          <a:p>
-            <a:r>
-              <a:rPr lang="en-US" sz="600" dirty="0" smtClean="0"/>
-              <a:t>  - </a:t>
-            </a:r>
-            <a:r>
-              <a:rPr lang="en-US" sz="600" dirty="0"/>
-              <a:t>turn on the charging IC</a:t>
-            </a:r>
-          </a:p>
-          <a:p>
-            <a:r>
-              <a:rPr lang="en-US" sz="600" dirty="0" smtClean="0"/>
-              <a:t>  - </a:t>
-            </a:r>
-            <a:r>
-              <a:rPr lang="en-US" sz="600" dirty="0" err="1"/>
-              <a:t>I</a:t>
-            </a:r>
-            <a:r>
-              <a:rPr lang="en-US" sz="600" baseline="-25000" dirty="0" err="1"/>
-              <a:t>charge,max</a:t>
-            </a:r>
-            <a:r>
-              <a:rPr lang="en-US" sz="600" dirty="0"/>
-              <a:t> = min(0.1/h*C, 3A/side</a:t>
-            </a:r>
-            <a:r>
-              <a:rPr lang="en-US" sz="600" dirty="0" smtClean="0"/>
-              <a:t>)</a:t>
-            </a:r>
-          </a:p>
-          <a:p>
-            <a:r>
-              <a:rPr lang="en-US" sz="600" dirty="0"/>
-              <a:t> </a:t>
-            </a:r>
-            <a:r>
-              <a:rPr lang="en-US" sz="600" dirty="0" smtClean="0"/>
-              <a:t> - configure charger</a:t>
-            </a:r>
-          </a:p>
-          <a:p>
-            <a:r>
-              <a:rPr lang="en-US" sz="600" dirty="0">
-                <a:solidFill>
-                  <a:schemeClr val="bg1">
-                    <a:lumMod val="50000"/>
-                  </a:schemeClr>
-                </a:solidFill>
-              </a:rPr>
-              <a:t> </a:t>
-            </a:r>
-            <a:r>
-              <a:rPr lang="en-US" sz="600" dirty="0" smtClean="0">
-                <a:solidFill>
-                  <a:schemeClr val="bg1">
-                    <a:lumMod val="50000"/>
-                  </a:schemeClr>
-                </a:solidFill>
-              </a:rPr>
-              <a:t> - delay to ensure charger is ready</a:t>
-            </a:r>
-          </a:p>
-          <a:p>
-            <a:r>
-              <a:rPr lang="en-US" sz="600" dirty="0"/>
-              <a:t> </a:t>
-            </a:r>
-            <a:r>
-              <a:rPr lang="en-US" sz="600" dirty="0" smtClean="0"/>
-              <a:t> - </a:t>
-            </a:r>
-            <a:r>
-              <a:rPr lang="en-US" sz="600" dirty="0"/>
-              <a:t>connect </a:t>
-            </a:r>
-            <a:r>
-              <a:rPr lang="en-US" sz="600" dirty="0" err="1" smtClean="0"/>
-              <a:t>sideA</a:t>
-            </a:r>
-            <a:r>
-              <a:rPr lang="en-US" sz="600" dirty="0" smtClean="0"/>
-              <a:t> and </a:t>
-            </a:r>
-            <a:r>
-              <a:rPr lang="en-US" sz="600" dirty="0" err="1" smtClean="0"/>
-              <a:t>sideB</a:t>
-            </a:r>
-            <a:endParaRPr lang="en-US" sz="600" dirty="0" smtClean="0"/>
-          </a:p>
-          <a:p>
-            <a:r>
-              <a:rPr lang="en-US" sz="600" dirty="0">
-                <a:solidFill>
-                  <a:schemeClr val="bg1">
-                    <a:lumMod val="50000"/>
-                  </a:schemeClr>
-                </a:solidFill>
-              </a:rPr>
-              <a:t> </a:t>
-            </a:r>
-            <a:r>
-              <a:rPr lang="en-US" sz="600" dirty="0" smtClean="0">
-                <a:solidFill>
-                  <a:schemeClr val="bg1">
-                    <a:lumMod val="50000"/>
-                  </a:schemeClr>
-                </a:solidFill>
-              </a:rPr>
-              <a:t> - delay to ensure valid current </a:t>
-            </a:r>
-            <a:r>
-              <a:rPr lang="en-US" sz="600" dirty="0" smtClean="0">
-                <a:solidFill>
-                  <a:schemeClr val="bg1">
-                    <a:lumMod val="50000"/>
-                  </a:schemeClr>
-                </a:solidFill>
-              </a:rPr>
-              <a:t>readings</a:t>
-            </a:r>
-            <a:endParaRPr lang="en-US" sz="600" dirty="0" smtClean="0">
-              <a:solidFill>
-                <a:schemeClr val="bg1">
-                  <a:lumMod val="50000"/>
-                </a:schemeClr>
-              </a:solidFill>
-            </a:endParaRPr>
-          </a:p>
-        </p:txBody>
-      </p:sp>
-      <p:sp>
-        <p:nvSpPr>
-          <p:cNvPr id="60" name="TextBox 59"/>
-          <p:cNvSpPr txBox="1"/>
-          <p:nvPr/>
-        </p:nvSpPr>
-        <p:spPr>
-          <a:xfrm>
-            <a:off x="4941836" y="2819400"/>
-            <a:ext cx="1382764" cy="276940"/>
-          </a:xfrm>
-          <a:prstGeom prst="rect">
-            <a:avLst/>
-          </a:prstGeom>
-          <a:solidFill>
-            <a:schemeClr val="bg1"/>
-          </a:solidFill>
-        </p:spPr>
-        <p:txBody>
-          <a:bodyPr wrap="square" lIns="91384" tIns="45691" rIns="91384" bIns="45691" rtlCol="0">
-            <a:spAutoFit/>
-          </a:bodyPr>
-          <a:lstStyle/>
-          <a:p>
-            <a:r>
-              <a:rPr lang="en-US" sz="600" u="sng" dirty="0" smtClean="0"/>
-              <a:t>0V &lt; </a:t>
-            </a:r>
-            <a:r>
-              <a:rPr lang="en-US" sz="600" u="sng" dirty="0" err="1" smtClean="0"/>
-              <a:t>V</a:t>
-            </a:r>
-            <a:r>
-              <a:rPr lang="en-US" sz="600" u="sng" baseline="-25000" dirty="0" err="1" smtClean="0"/>
-              <a:t>sideA</a:t>
-            </a:r>
-            <a:r>
-              <a:rPr lang="en-US" sz="600" u="sng" dirty="0" smtClean="0"/>
-              <a:t> AND 0V &lt; </a:t>
-            </a:r>
-            <a:r>
-              <a:rPr lang="en-US" sz="600" u="sng" dirty="0" err="1" smtClean="0"/>
-              <a:t>V</a:t>
-            </a:r>
-            <a:r>
-              <a:rPr lang="en-US" sz="600" u="sng" baseline="-25000" dirty="0" err="1" smtClean="0"/>
-              <a:t>sideB</a:t>
-            </a:r>
-            <a:endParaRPr lang="en-US" sz="600" u="sng" dirty="0"/>
-          </a:p>
-          <a:p>
-            <a:r>
-              <a:rPr lang="en-US" sz="600" dirty="0" smtClean="0"/>
-              <a:t>  - update the UI to indicate charging</a:t>
-            </a:r>
-            <a:endParaRPr lang="en-US" sz="600" dirty="0" smtClean="0"/>
-          </a:p>
-        </p:txBody>
-      </p:sp>
-      <p:sp>
-        <p:nvSpPr>
-          <p:cNvPr id="61" name="TextBox 60"/>
-          <p:cNvSpPr txBox="1"/>
-          <p:nvPr/>
-        </p:nvSpPr>
-        <p:spPr>
-          <a:xfrm>
-            <a:off x="5394233" y="2634793"/>
-            <a:ext cx="715132" cy="184607"/>
-          </a:xfrm>
-          <a:prstGeom prst="rect">
-            <a:avLst/>
-          </a:prstGeom>
-          <a:solidFill>
-            <a:schemeClr val="bg1"/>
-          </a:solidFill>
-        </p:spPr>
-        <p:txBody>
-          <a:bodyPr wrap="square" lIns="91384" tIns="45691" rIns="91384" bIns="45691" rtlCol="0">
-            <a:spAutoFit/>
-          </a:bodyPr>
-          <a:lstStyle/>
-          <a:p>
-            <a:r>
-              <a:rPr lang="en-US" sz="600" dirty="0">
-                <a:solidFill>
-                  <a:schemeClr val="accent3">
-                    <a:lumMod val="50000"/>
-                  </a:schemeClr>
-                </a:solidFill>
-              </a:rPr>
-              <a:t>b</a:t>
-            </a:r>
-            <a:r>
-              <a:rPr lang="en-US" sz="600" dirty="0" smtClean="0">
-                <a:solidFill>
-                  <a:schemeClr val="accent3">
-                    <a:lumMod val="50000"/>
-                  </a:schemeClr>
-                </a:solidFill>
-              </a:rPr>
-              <a:t>attery detected</a:t>
-            </a:r>
-            <a:endParaRPr lang="en-US" sz="600" dirty="0" smtClean="0">
-              <a:solidFill>
-                <a:schemeClr val="accent3">
-                  <a:lumMod val="50000"/>
-                </a:schemeClr>
-              </a:solidFill>
-            </a:endParaRPr>
-          </a:p>
-        </p:txBody>
-      </p:sp>
-      <p:sp>
-        <p:nvSpPr>
-          <p:cNvPr id="62" name="TextBox 61"/>
-          <p:cNvSpPr txBox="1"/>
-          <p:nvPr/>
-        </p:nvSpPr>
-        <p:spPr>
-          <a:xfrm>
-            <a:off x="6449785" y="4299234"/>
-            <a:ext cx="812760" cy="184607"/>
+            <a:off x="6355426" y="8206423"/>
+            <a:ext cx="1149251" cy="184607"/>
           </a:xfrm>
           <a:prstGeom prst="rect">
             <a:avLst/>
@@ -7667,7 +7727,7 @@
                   </a:schemeClr>
                 </a:solidFill>
               </a:rPr>
-              <a:t>ufficiently revived</a:t>
+              <a:t>hort detected via voltage sag</a:t>
             </a:r>
             <a:endParaRPr lang="en-US" sz="600" dirty="0" smtClean="0">
               <a:solidFill>
@@ -7679,52 +7739,16 @@
           </a:p>
         </p:txBody>
       </p:sp>
-      <p:cxnSp>
-        <p:nvCxnSpPr>
-          <p:cNvPr id="63" name="Curved Connector 62"/>
-          <p:cNvCxnSpPr/>
-          <p:nvPr/>
-        </p:nvCxnSpPr>
-        <p:spPr>
-          <a:xfrm rot="5400000" flipH="1">
-            <a:off x="8050644" y="2852824"/>
-            <a:ext cx="114300" cy="381000"/>
-          </a:xfrm>
-          <a:prstGeom prst="curvedConnector4">
-            <a:avLst>
-              <a:gd name="adj1" fmla="val -405556"/>
-              <a:gd name="adj2" fmla="val 181667"/>
-            </a:avLst>
-          </a:prstGeom>
-          <a:ln>
-            <a:tailEnd type="arrow"/>
-          </a:ln>
-        </p:spPr>
-        <p:style>
-          <a:lnRef idx="1">
-            <a:schemeClr val="accent1"/>
-          </a:lnRef>
-          <a:fillRef idx="0">
-            <a:schemeClr val="accent1"/>
-          </a:fillRef>
-          <a:effectRef idx="0">
-            <a:schemeClr val="accent1"/>
-          </a:effectRef>
-          <a:fontRef idx="minor">
-            <a:schemeClr val="tx1"/>
-          </a:fontRef>
-        </p:style>
-      </p:cxnSp>
-      <p:sp>
-        <p:nvSpPr>
-          <p:cNvPr id="64" name="TextBox 63"/>
+      <p:sp>
+        <p:nvSpPr>
+          <p:cNvPr id="91" name="TextBox 90"/>
           <p:cNvSpPr txBox="1"/>
           <p:nvPr/>
         </p:nvSpPr>
         <p:spPr>
           <a:xfrm>
-            <a:off x="7732152" y="3479976"/>
-            <a:ext cx="1093428" cy="276940"/>
+            <a:off x="7360701" y="8405953"/>
+            <a:ext cx="1149251" cy="276940"/>
           </a:xfrm>
           <a:prstGeom prst="rect">
             <a:avLst/>
@@ -7739,83 +7763,6 @@
           </a:bodyPr>
           <a:lstStyle/>
           <a:p>
-            <a:r>
-              <a:rPr lang="en-US" sz="600" u="sng" dirty="0"/>
-              <a:t>0V </a:t>
-            </a:r>
-            <a:r>
-              <a:rPr lang="en-US" sz="600" u="sng" dirty="0" smtClean="0"/>
-              <a:t>~= </a:t>
-            </a:r>
-            <a:r>
-              <a:rPr lang="en-US" sz="600" u="sng" dirty="0" err="1"/>
-              <a:t>V</a:t>
-            </a:r>
-            <a:r>
-              <a:rPr lang="en-US" sz="600" u="sng" baseline="-25000" dirty="0" err="1"/>
-              <a:t>sideA</a:t>
-            </a:r>
-            <a:r>
-              <a:rPr lang="en-US" sz="600" u="sng" dirty="0"/>
-              <a:t> AND 0V </a:t>
-            </a:r>
-            <a:r>
-              <a:rPr lang="en-US" sz="600" u="sng" dirty="0" smtClean="0"/>
-              <a:t>~= </a:t>
-            </a:r>
-            <a:r>
-              <a:rPr lang="en-US" sz="600" u="sng" dirty="0" err="1"/>
-              <a:t>V</a:t>
-            </a:r>
-            <a:r>
-              <a:rPr lang="en-US" sz="600" u="sng" baseline="-25000" dirty="0" err="1"/>
-              <a:t>sideB</a:t>
-            </a:r>
-            <a:endParaRPr lang="en-US" sz="600" u="sng" dirty="0"/>
-          </a:p>
-          <a:p>
-            <a:r>
-              <a:rPr lang="en-US" sz="600" dirty="0" smtClean="0"/>
-              <a:t>  - reset</a:t>
-            </a:r>
-            <a:endParaRPr lang="en-US" sz="600" baseline="-25000" dirty="0" smtClean="0"/>
-          </a:p>
-        </p:txBody>
-      </p:sp>
-      <p:sp>
-        <p:nvSpPr>
-          <p:cNvPr id="65" name="TextBox 64"/>
-          <p:cNvSpPr txBox="1"/>
-          <p:nvPr/>
-        </p:nvSpPr>
-        <p:spPr>
-          <a:xfrm>
-            <a:off x="8799467" y="3329160"/>
-            <a:ext cx="1260494" cy="369273"/>
-          </a:xfrm>
-          <a:prstGeom prst="rect">
-            <a:avLst/>
-          </a:prstGeom>
-          <a:solidFill>
-            <a:schemeClr val="bg1"/>
-          </a:solidFill>
-        </p:spPr>
-        <p:txBody>
-          <a:bodyPr wrap="square" lIns="91384" tIns="45691" rIns="91384" bIns="45691" rtlCol="0">
-            <a:spAutoFit/>
-          </a:bodyPr>
-          <a:lstStyle/>
-          <a:p>
-            <a:r>
-              <a:rPr lang="en-US" sz="600" dirty="0">
-                <a:solidFill>
-                  <a:schemeClr val="accent3">
-                    <a:lumMod val="50000"/>
-                  </a:schemeClr>
-                </a:solidFill>
-              </a:rPr>
-              <a:t>b</a:t>
-            </a:r>
             <a:r>
               <a:rPr lang="en-US" sz="600" dirty="0" smtClean="0">
                 <a:solidFill>
@@ -7824,7 +7771,7 @@
                   </a:schemeClr>
                 </a:solidFill>
               </a:rPr>
-              <a:t>attery pulled.  NB: never disable the charger or else we will NOT be able to sense the voltage</a:t>
+              <a:t>TODO: NOT FULLY IMPLEMENTED YET</a:t>
             </a:r>
             <a:endParaRPr lang="en-US" sz="600" dirty="0" smtClean="0">
               <a:solidFill>

</xml_diff>